<commit_message>
v1.1 mecm call flows updated
</commit_message>
<xml_diff>
--- a/MECM PT/Release V1.1/MECM-Call-Flows.pptx
+++ b/MECM PT/Release V1.1/MECM-Call-Flows.pptx
@@ -13,7 +13,7 @@
     <p:sldId id="260" r:id="rId8"/>
   </p:sldIdLst>
   <p:sldSz cx="9144000" cy="5143500"/>
-  <p:notesSz cx="6858000" cy="9144000"/>
+  <p:notesSz cx="7559675" cy="10691812"/>
 </p:presentation>
 </file>
 
@@ -58,7 +58,7 @@
       </p:grpSpPr>
       <p:sp>
         <p:nvSpPr>
-          <p:cNvPr id="24" name="PlaceHolder 1"/>
+          <p:cNvPr id="23" name="PlaceHolder 1"/>
           <p:cNvSpPr>
             <a:spLocks noGrp="1"/>
           </p:cNvSpPr>
@@ -68,8 +68,8 @@
         </p:nvSpPr>
         <p:spPr>
           <a:xfrm>
-            <a:off x="311760" y="444960"/>
-            <a:ext cx="8520120" cy="572400"/>
+            <a:off x="311760" y="418320"/>
+            <a:ext cx="8519760" cy="625320"/>
           </a:xfrm>
           <a:prstGeom prst="rect">
             <a:avLst/>
@@ -78,23 +78,24 @@
         <p:txBody>
           <a:bodyPr lIns="0" rIns="0" tIns="0" bIns="0" anchor="ctr"/>
           <a:p>
-            <a:endParaRPr b="0" lang="en-IN" sz="1400" spc="-1" strike="noStrike">
-              <a:solidFill>
-                <a:srgbClr val="000000"/>
-              </a:solidFill>
-              <a:uFill>
-                <a:solidFill>
-                  <a:srgbClr val="ffffff"/>
-                </a:solidFill>
-              </a:uFill>
-              <a:latin typeface="Arial"/>
-            </a:endParaRPr>
-          </a:p>
-        </p:txBody>
-      </p:sp>
-      <p:sp>
-        <p:nvSpPr>
-          <p:cNvPr id="25" name="PlaceHolder 2"/>
+            <a:pPr algn="ctr"/>
+            <a:endParaRPr b="0" lang="en-IN" sz="4400" spc="-1" strike="noStrike">
+              <a:solidFill>
+                <a:srgbClr val="000000"/>
+              </a:solidFill>
+              <a:uFill>
+                <a:solidFill>
+                  <a:srgbClr val="ffffff"/>
+                </a:solidFill>
+              </a:uFill>
+              <a:latin typeface="Arial"/>
+            </a:endParaRPr>
+          </a:p>
+        </p:txBody>
+      </p:sp>
+      <p:sp>
+        <p:nvSpPr>
+          <p:cNvPr id="24" name="PlaceHolder 2"/>
           <p:cNvSpPr>
             <a:spLocks noGrp="1"/>
           </p:cNvSpPr>
@@ -105,7 +106,7 @@
         <p:spPr>
           <a:xfrm>
             <a:off x="311760" y="1152360"/>
-            <a:ext cx="8520120" cy="1629360"/>
+            <a:ext cx="8519760" cy="1629000"/>
           </a:xfrm>
           <a:prstGeom prst="rect">
             <a:avLst/>
@@ -114,23 +115,23 @@
         <p:txBody>
           <a:bodyPr lIns="0" rIns="0" tIns="0" bIns="0"/>
           <a:p>
-            <a:endParaRPr b="0" lang="en-IN" sz="1400" spc="-1" strike="noStrike">
-              <a:solidFill>
-                <a:srgbClr val="000000"/>
-              </a:solidFill>
-              <a:uFill>
-                <a:solidFill>
-                  <a:srgbClr val="ffffff"/>
-                </a:solidFill>
-              </a:uFill>
-              <a:latin typeface="Arial"/>
-            </a:endParaRPr>
-          </a:p>
-        </p:txBody>
-      </p:sp>
-      <p:sp>
-        <p:nvSpPr>
-          <p:cNvPr id="26" name="PlaceHolder 3"/>
+            <a:endParaRPr b="0" lang="en-IN" sz="3200" spc="-1" strike="noStrike">
+              <a:solidFill>
+                <a:srgbClr val="000000"/>
+              </a:solidFill>
+              <a:uFill>
+                <a:solidFill>
+                  <a:srgbClr val="ffffff"/>
+                </a:solidFill>
+              </a:uFill>
+              <a:latin typeface="Arial"/>
+            </a:endParaRPr>
+          </a:p>
+        </p:txBody>
+      </p:sp>
+      <p:sp>
+        <p:nvSpPr>
+          <p:cNvPr id="25" name="PlaceHolder 3"/>
           <p:cNvSpPr>
             <a:spLocks noGrp="1"/>
           </p:cNvSpPr>
@@ -140,8 +141,8 @@
         </p:nvSpPr>
         <p:spPr>
           <a:xfrm>
-            <a:off x="311760" y="2936880"/>
-            <a:ext cx="8520120" cy="1629360"/>
+            <a:off x="311760" y="2936520"/>
+            <a:ext cx="8519760" cy="1629000"/>
           </a:xfrm>
           <a:prstGeom prst="rect">
             <a:avLst/>
@@ -150,7 +151,7 @@
         <p:txBody>
           <a:bodyPr lIns="0" rIns="0" tIns="0" bIns="0"/>
           <a:p>
-            <a:endParaRPr b="0" lang="en-IN" sz="1400" spc="-1" strike="noStrike">
+            <a:endParaRPr b="0" lang="en-IN" sz="3200" spc="-1" strike="noStrike">
               <a:solidFill>
                 <a:srgbClr val="000000"/>
               </a:solidFill>
@@ -188,7 +189,7 @@
       </p:grpSpPr>
       <p:sp>
         <p:nvSpPr>
-          <p:cNvPr id="27" name="PlaceHolder 1"/>
+          <p:cNvPr id="26" name="PlaceHolder 1"/>
           <p:cNvSpPr>
             <a:spLocks noGrp="1"/>
           </p:cNvSpPr>
@@ -198,8 +199,8 @@
         </p:nvSpPr>
         <p:spPr>
           <a:xfrm>
-            <a:off x="311760" y="444960"/>
-            <a:ext cx="8520120" cy="572400"/>
+            <a:off x="311760" y="418320"/>
+            <a:ext cx="8519760" cy="625320"/>
           </a:xfrm>
           <a:prstGeom prst="rect">
             <a:avLst/>
@@ -208,23 +209,24 @@
         <p:txBody>
           <a:bodyPr lIns="0" rIns="0" tIns="0" bIns="0" anchor="ctr"/>
           <a:p>
-            <a:endParaRPr b="0" lang="en-IN" sz="1400" spc="-1" strike="noStrike">
-              <a:solidFill>
-                <a:srgbClr val="000000"/>
-              </a:solidFill>
-              <a:uFill>
-                <a:solidFill>
-                  <a:srgbClr val="ffffff"/>
-                </a:solidFill>
-              </a:uFill>
-              <a:latin typeface="Arial"/>
-            </a:endParaRPr>
-          </a:p>
-        </p:txBody>
-      </p:sp>
-      <p:sp>
-        <p:nvSpPr>
-          <p:cNvPr id="28" name="PlaceHolder 2"/>
+            <a:pPr algn="ctr"/>
+            <a:endParaRPr b="0" lang="en-IN" sz="4400" spc="-1" strike="noStrike">
+              <a:solidFill>
+                <a:srgbClr val="000000"/>
+              </a:solidFill>
+              <a:uFill>
+                <a:solidFill>
+                  <a:srgbClr val="ffffff"/>
+                </a:solidFill>
+              </a:uFill>
+              <a:latin typeface="Arial"/>
+            </a:endParaRPr>
+          </a:p>
+        </p:txBody>
+      </p:sp>
+      <p:sp>
+        <p:nvSpPr>
+          <p:cNvPr id="27" name="PlaceHolder 2"/>
           <p:cNvSpPr>
             <a:spLocks noGrp="1"/>
           </p:cNvSpPr>
@@ -235,7 +237,7 @@
         <p:spPr>
           <a:xfrm>
             <a:off x="311760" y="1152360"/>
-            <a:ext cx="4157640" cy="1629360"/>
+            <a:ext cx="4157280" cy="1629000"/>
           </a:xfrm>
           <a:prstGeom prst="rect">
             <a:avLst/>
@@ -244,23 +246,23 @@
         <p:txBody>
           <a:bodyPr lIns="0" rIns="0" tIns="0" bIns="0"/>
           <a:p>
-            <a:endParaRPr b="0" lang="en-IN" sz="1400" spc="-1" strike="noStrike">
-              <a:solidFill>
-                <a:srgbClr val="000000"/>
-              </a:solidFill>
-              <a:uFill>
-                <a:solidFill>
-                  <a:srgbClr val="ffffff"/>
-                </a:solidFill>
-              </a:uFill>
-              <a:latin typeface="Arial"/>
-            </a:endParaRPr>
-          </a:p>
-        </p:txBody>
-      </p:sp>
-      <p:sp>
-        <p:nvSpPr>
-          <p:cNvPr id="29" name="PlaceHolder 3"/>
+            <a:endParaRPr b="0" lang="en-IN" sz="3200" spc="-1" strike="noStrike">
+              <a:solidFill>
+                <a:srgbClr val="000000"/>
+              </a:solidFill>
+              <a:uFill>
+                <a:solidFill>
+                  <a:srgbClr val="ffffff"/>
+                </a:solidFill>
+              </a:uFill>
+              <a:latin typeface="Arial"/>
+            </a:endParaRPr>
+          </a:p>
+        </p:txBody>
+      </p:sp>
+      <p:sp>
+        <p:nvSpPr>
+          <p:cNvPr id="28" name="PlaceHolder 3"/>
           <p:cNvSpPr>
             <a:spLocks noGrp="1"/>
           </p:cNvSpPr>
@@ -270,8 +272,8 @@
         </p:nvSpPr>
         <p:spPr>
           <a:xfrm>
-            <a:off x="4677840" y="1152360"/>
-            <a:ext cx="4157640" cy="1629360"/>
+            <a:off x="4677120" y="1152360"/>
+            <a:ext cx="4157280" cy="1629000"/>
           </a:xfrm>
           <a:prstGeom prst="rect">
             <a:avLst/>
@@ -280,23 +282,23 @@
         <p:txBody>
           <a:bodyPr lIns="0" rIns="0" tIns="0" bIns="0"/>
           <a:p>
-            <a:endParaRPr b="0" lang="en-IN" sz="1400" spc="-1" strike="noStrike">
-              <a:solidFill>
-                <a:srgbClr val="000000"/>
-              </a:solidFill>
-              <a:uFill>
-                <a:solidFill>
-                  <a:srgbClr val="ffffff"/>
-                </a:solidFill>
-              </a:uFill>
-              <a:latin typeface="Arial"/>
-            </a:endParaRPr>
-          </a:p>
-        </p:txBody>
-      </p:sp>
-      <p:sp>
-        <p:nvSpPr>
-          <p:cNvPr id="30" name="PlaceHolder 4"/>
+            <a:endParaRPr b="0" lang="en-IN" sz="3200" spc="-1" strike="noStrike">
+              <a:solidFill>
+                <a:srgbClr val="000000"/>
+              </a:solidFill>
+              <a:uFill>
+                <a:solidFill>
+                  <a:srgbClr val="ffffff"/>
+                </a:solidFill>
+              </a:uFill>
+              <a:latin typeface="Arial"/>
+            </a:endParaRPr>
+          </a:p>
+        </p:txBody>
+      </p:sp>
+      <p:sp>
+        <p:nvSpPr>
+          <p:cNvPr id="29" name="PlaceHolder 4"/>
           <p:cNvSpPr>
             <a:spLocks noGrp="1"/>
           </p:cNvSpPr>
@@ -306,8 +308,8 @@
         </p:nvSpPr>
         <p:spPr>
           <a:xfrm>
-            <a:off x="4677840" y="2936880"/>
-            <a:ext cx="4157640" cy="1629360"/>
+            <a:off x="4677120" y="2936520"/>
+            <a:ext cx="4157280" cy="1629000"/>
           </a:xfrm>
           <a:prstGeom prst="rect">
             <a:avLst/>
@@ -316,23 +318,23 @@
         <p:txBody>
           <a:bodyPr lIns="0" rIns="0" tIns="0" bIns="0"/>
           <a:p>
-            <a:endParaRPr b="0" lang="en-IN" sz="1400" spc="-1" strike="noStrike">
-              <a:solidFill>
-                <a:srgbClr val="000000"/>
-              </a:solidFill>
-              <a:uFill>
-                <a:solidFill>
-                  <a:srgbClr val="ffffff"/>
-                </a:solidFill>
-              </a:uFill>
-              <a:latin typeface="Arial"/>
-            </a:endParaRPr>
-          </a:p>
-        </p:txBody>
-      </p:sp>
-      <p:sp>
-        <p:nvSpPr>
-          <p:cNvPr id="31" name="PlaceHolder 5"/>
+            <a:endParaRPr b="0" lang="en-IN" sz="3200" spc="-1" strike="noStrike">
+              <a:solidFill>
+                <a:srgbClr val="000000"/>
+              </a:solidFill>
+              <a:uFill>
+                <a:solidFill>
+                  <a:srgbClr val="ffffff"/>
+                </a:solidFill>
+              </a:uFill>
+              <a:latin typeface="Arial"/>
+            </a:endParaRPr>
+          </a:p>
+        </p:txBody>
+      </p:sp>
+      <p:sp>
+        <p:nvSpPr>
+          <p:cNvPr id="30" name="PlaceHolder 5"/>
           <p:cNvSpPr>
             <a:spLocks noGrp="1"/>
           </p:cNvSpPr>
@@ -342,8 +344,8 @@
         </p:nvSpPr>
         <p:spPr>
           <a:xfrm>
-            <a:off x="311760" y="2936880"/>
-            <a:ext cx="4157640" cy="1629360"/>
+            <a:off x="311760" y="2936520"/>
+            <a:ext cx="4157280" cy="1629000"/>
           </a:xfrm>
           <a:prstGeom prst="rect">
             <a:avLst/>
@@ -352,7 +354,7 @@
         <p:txBody>
           <a:bodyPr lIns="0" rIns="0" tIns="0" bIns="0"/>
           <a:p>
-            <a:endParaRPr b="0" lang="en-IN" sz="1400" spc="-1" strike="noStrike">
+            <a:endParaRPr b="0" lang="en-IN" sz="3200" spc="-1" strike="noStrike">
               <a:solidFill>
                 <a:srgbClr val="000000"/>
               </a:solidFill>
@@ -390,7 +392,7 @@
       </p:grpSpPr>
       <p:sp>
         <p:nvSpPr>
-          <p:cNvPr id="32" name="PlaceHolder 1"/>
+          <p:cNvPr id="31" name="PlaceHolder 1"/>
           <p:cNvSpPr>
             <a:spLocks noGrp="1"/>
           </p:cNvSpPr>
@@ -400,8 +402,8 @@
         </p:nvSpPr>
         <p:spPr>
           <a:xfrm>
-            <a:off x="311760" y="444960"/>
-            <a:ext cx="8520120" cy="572400"/>
+            <a:off x="311760" y="418320"/>
+            <a:ext cx="8519760" cy="625320"/>
           </a:xfrm>
           <a:prstGeom prst="rect">
             <a:avLst/>
@@ -410,23 +412,24 @@
         <p:txBody>
           <a:bodyPr lIns="0" rIns="0" tIns="0" bIns="0" anchor="ctr"/>
           <a:p>
-            <a:endParaRPr b="0" lang="en-IN" sz="1400" spc="-1" strike="noStrike">
-              <a:solidFill>
-                <a:srgbClr val="000000"/>
-              </a:solidFill>
-              <a:uFill>
-                <a:solidFill>
-                  <a:srgbClr val="ffffff"/>
-                </a:solidFill>
-              </a:uFill>
-              <a:latin typeface="Arial"/>
-            </a:endParaRPr>
-          </a:p>
-        </p:txBody>
-      </p:sp>
-      <p:sp>
-        <p:nvSpPr>
-          <p:cNvPr id="33" name="PlaceHolder 2"/>
+            <a:pPr algn="ctr"/>
+            <a:endParaRPr b="0" lang="en-IN" sz="4400" spc="-1" strike="noStrike">
+              <a:solidFill>
+                <a:srgbClr val="000000"/>
+              </a:solidFill>
+              <a:uFill>
+                <a:solidFill>
+                  <a:srgbClr val="ffffff"/>
+                </a:solidFill>
+              </a:uFill>
+              <a:latin typeface="Arial"/>
+            </a:endParaRPr>
+          </a:p>
+        </p:txBody>
+      </p:sp>
+      <p:sp>
+        <p:nvSpPr>
+          <p:cNvPr id="32" name="PlaceHolder 2"/>
           <p:cNvSpPr>
             <a:spLocks noGrp="1"/>
           </p:cNvSpPr>
@@ -437,7 +440,7 @@
         <p:spPr>
           <a:xfrm>
             <a:off x="311760" y="1152360"/>
-            <a:ext cx="8520120" cy="3416040"/>
+            <a:ext cx="8519760" cy="3415680"/>
           </a:xfrm>
           <a:prstGeom prst="rect">
             <a:avLst/>
@@ -446,23 +449,23 @@
         <p:txBody>
           <a:bodyPr lIns="0" rIns="0" tIns="0" bIns="0"/>
           <a:p>
-            <a:endParaRPr b="0" lang="en-IN" sz="1400" spc="-1" strike="noStrike">
-              <a:solidFill>
-                <a:srgbClr val="000000"/>
-              </a:solidFill>
-              <a:uFill>
-                <a:solidFill>
-                  <a:srgbClr val="ffffff"/>
-                </a:solidFill>
-              </a:uFill>
-              <a:latin typeface="Arial"/>
-            </a:endParaRPr>
-          </a:p>
-        </p:txBody>
-      </p:sp>
-      <p:sp>
-        <p:nvSpPr>
-          <p:cNvPr id="34" name="PlaceHolder 3"/>
+            <a:endParaRPr b="0" lang="en-IN" sz="3200" spc="-1" strike="noStrike">
+              <a:solidFill>
+                <a:srgbClr val="000000"/>
+              </a:solidFill>
+              <a:uFill>
+                <a:solidFill>
+                  <a:srgbClr val="ffffff"/>
+                </a:solidFill>
+              </a:uFill>
+              <a:latin typeface="Arial"/>
+            </a:endParaRPr>
+          </a:p>
+        </p:txBody>
+      </p:sp>
+      <p:sp>
+        <p:nvSpPr>
+          <p:cNvPr id="33" name="PlaceHolder 3"/>
           <p:cNvSpPr>
             <a:spLocks noGrp="1"/>
           </p:cNvSpPr>
@@ -473,7 +476,7 @@
         <p:spPr>
           <a:xfrm>
             <a:off x="311760" y="1152360"/>
-            <a:ext cx="8520120" cy="3416040"/>
+            <a:ext cx="8519760" cy="3415680"/>
           </a:xfrm>
           <a:prstGeom prst="rect">
             <a:avLst/>
@@ -482,20 +485,43 @@
         <p:txBody>
           <a:bodyPr lIns="0" rIns="0" tIns="0" bIns="0"/>
           <a:p>
-            <a:endParaRPr b="0" lang="en-IN" sz="1400" spc="-1" strike="noStrike">
-              <a:solidFill>
-                <a:srgbClr val="000000"/>
-              </a:solidFill>
-              <a:uFill>
-                <a:solidFill>
-                  <a:srgbClr val="ffffff"/>
-                </a:solidFill>
-              </a:uFill>
-              <a:latin typeface="Arial"/>
-            </a:endParaRPr>
-          </a:p>
-        </p:txBody>
-      </p:sp>
+            <a:endParaRPr b="0" lang="en-IN" sz="3200" spc="-1" strike="noStrike">
+              <a:solidFill>
+                <a:srgbClr val="000000"/>
+              </a:solidFill>
+              <a:uFill>
+                <a:solidFill>
+                  <a:srgbClr val="ffffff"/>
+                </a:solidFill>
+              </a:uFill>
+              <a:latin typeface="Arial"/>
+            </a:endParaRPr>
+          </a:p>
+        </p:txBody>
+      </p:sp>
+      <p:pic>
+        <p:nvPicPr>
+          <p:cNvPr id="34" name="" descr=""/>
+          <p:cNvPicPr/>
+          <p:nvPr/>
+        </p:nvPicPr>
+        <p:blipFill>
+          <a:blip r:embed="rId2"/>
+          <a:stretch/>
+        </p:blipFill>
+        <p:spPr>
+          <a:xfrm>
+            <a:off x="2431080" y="1152360"/>
+            <a:ext cx="4280760" cy="3415680"/>
+          </a:xfrm>
+          <a:prstGeom prst="rect">
+            <a:avLst/>
+          </a:prstGeom>
+          <a:ln>
+            <a:noFill/>
+          </a:ln>
+        </p:spPr>
+      </p:pic>
       <p:pic>
         <p:nvPicPr>
           <p:cNvPr id="35" name="" descr=""/>
@@ -503,36 +529,13 @@
           <p:nvPr/>
         </p:nvPicPr>
         <p:blipFill>
-          <a:blip r:embed="rId2"/>
-          <a:stretch/>
-        </p:blipFill>
-        <p:spPr>
-          <a:xfrm>
-            <a:off x="2430720" y="1152000"/>
-            <a:ext cx="4281480" cy="3416040"/>
-          </a:xfrm>
-          <a:prstGeom prst="rect">
-            <a:avLst/>
-          </a:prstGeom>
-          <a:ln>
-            <a:noFill/>
-          </a:ln>
-        </p:spPr>
-      </p:pic>
-      <p:pic>
-        <p:nvPicPr>
-          <p:cNvPr id="36" name="" descr=""/>
-          <p:cNvPicPr/>
-          <p:nvPr/>
-        </p:nvPicPr>
-        <p:blipFill>
           <a:blip r:embed="rId3"/>
           <a:stretch/>
         </p:blipFill>
         <p:spPr>
           <a:xfrm>
-            <a:off x="2430720" y="1152000"/>
-            <a:ext cx="4281480" cy="3416040"/>
+            <a:off x="2431080" y="1152360"/>
+            <a:ext cx="4280760" cy="3415680"/>
           </a:xfrm>
           <a:prstGeom prst="rect">
             <a:avLst/>
@@ -588,7 +591,7 @@
       </p:grpSpPr>
       <p:sp>
         <p:nvSpPr>
-          <p:cNvPr id="40" name="PlaceHolder 1"/>
+          <p:cNvPr id="38" name="PlaceHolder 1"/>
           <p:cNvSpPr>
             <a:spLocks noGrp="1"/>
           </p:cNvSpPr>
@@ -598,8 +601,8 @@
         </p:nvSpPr>
         <p:spPr>
           <a:xfrm>
-            <a:off x="311760" y="444960"/>
-            <a:ext cx="8520120" cy="572400"/>
+            <a:off x="311760" y="418320"/>
+            <a:ext cx="8519760" cy="625320"/>
           </a:xfrm>
           <a:prstGeom prst="rect">
             <a:avLst/>
@@ -608,23 +611,24 @@
         <p:txBody>
           <a:bodyPr lIns="0" rIns="0" tIns="0" bIns="0" anchor="ctr"/>
           <a:p>
-            <a:endParaRPr b="0" lang="en-IN" sz="1400" spc="-1" strike="noStrike">
-              <a:solidFill>
-                <a:srgbClr val="000000"/>
-              </a:solidFill>
-              <a:uFill>
-                <a:solidFill>
-                  <a:srgbClr val="ffffff"/>
-                </a:solidFill>
-              </a:uFill>
-              <a:latin typeface="Arial"/>
-            </a:endParaRPr>
-          </a:p>
-        </p:txBody>
-      </p:sp>
-      <p:sp>
-        <p:nvSpPr>
-          <p:cNvPr id="41" name="PlaceHolder 2"/>
+            <a:pPr algn="ctr"/>
+            <a:endParaRPr b="0" lang="en-IN" sz="4400" spc="-1" strike="noStrike">
+              <a:solidFill>
+                <a:srgbClr val="000000"/>
+              </a:solidFill>
+              <a:uFill>
+                <a:solidFill>
+                  <a:srgbClr val="ffffff"/>
+                </a:solidFill>
+              </a:uFill>
+              <a:latin typeface="Arial"/>
+            </a:endParaRPr>
+          </a:p>
+        </p:txBody>
+      </p:sp>
+      <p:sp>
+        <p:nvSpPr>
+          <p:cNvPr id="39" name="PlaceHolder 2"/>
           <p:cNvSpPr>
             <a:spLocks noGrp="1"/>
           </p:cNvSpPr>
@@ -635,7 +639,7 @@
         <p:spPr>
           <a:xfrm>
             <a:off x="311760" y="1152360"/>
-            <a:ext cx="8520120" cy="3416040"/>
+            <a:ext cx="8519760" cy="3415680"/>
           </a:xfrm>
           <a:prstGeom prst="rect">
             <a:avLst/>
@@ -683,7 +687,7 @@
       </p:grpSpPr>
       <p:sp>
         <p:nvSpPr>
-          <p:cNvPr id="42" name="PlaceHolder 1"/>
+          <p:cNvPr id="40" name="PlaceHolder 1"/>
           <p:cNvSpPr>
             <a:spLocks noGrp="1"/>
           </p:cNvSpPr>
@@ -693,8 +697,8 @@
         </p:nvSpPr>
         <p:spPr>
           <a:xfrm>
-            <a:off x="311760" y="444960"/>
-            <a:ext cx="8520120" cy="572400"/>
+            <a:off x="311760" y="418320"/>
+            <a:ext cx="8519760" cy="625320"/>
           </a:xfrm>
           <a:prstGeom prst="rect">
             <a:avLst/>
@@ -703,23 +707,24 @@
         <p:txBody>
           <a:bodyPr lIns="0" rIns="0" tIns="0" bIns="0" anchor="ctr"/>
           <a:p>
-            <a:endParaRPr b="0" lang="en-IN" sz="1400" spc="-1" strike="noStrike">
-              <a:solidFill>
-                <a:srgbClr val="000000"/>
-              </a:solidFill>
-              <a:uFill>
-                <a:solidFill>
-                  <a:srgbClr val="ffffff"/>
-                </a:solidFill>
-              </a:uFill>
-              <a:latin typeface="Arial"/>
-            </a:endParaRPr>
-          </a:p>
-        </p:txBody>
-      </p:sp>
-      <p:sp>
-        <p:nvSpPr>
-          <p:cNvPr id="43" name="PlaceHolder 2"/>
+            <a:pPr algn="ctr"/>
+            <a:endParaRPr b="0" lang="en-IN" sz="4400" spc="-1" strike="noStrike">
+              <a:solidFill>
+                <a:srgbClr val="000000"/>
+              </a:solidFill>
+              <a:uFill>
+                <a:solidFill>
+                  <a:srgbClr val="ffffff"/>
+                </a:solidFill>
+              </a:uFill>
+              <a:latin typeface="Arial"/>
+            </a:endParaRPr>
+          </a:p>
+        </p:txBody>
+      </p:sp>
+      <p:sp>
+        <p:nvSpPr>
+          <p:cNvPr id="41" name="PlaceHolder 2"/>
           <p:cNvSpPr>
             <a:spLocks noGrp="1"/>
           </p:cNvSpPr>
@@ -730,7 +735,7 @@
         <p:spPr>
           <a:xfrm>
             <a:off x="311760" y="1152360"/>
-            <a:ext cx="8520120" cy="3416040"/>
+            <a:ext cx="8519760" cy="3415680"/>
           </a:xfrm>
           <a:prstGeom prst="rect">
             <a:avLst/>
@@ -739,7 +744,7 @@
         <p:txBody>
           <a:bodyPr lIns="0" rIns="0" tIns="0" bIns="0"/>
           <a:p>
-            <a:endParaRPr b="0" lang="en-IN" sz="1400" spc="-1" strike="noStrike">
+            <a:endParaRPr b="0" lang="en-IN" sz="3200" spc="-1" strike="noStrike">
               <a:solidFill>
                 <a:srgbClr val="000000"/>
               </a:solidFill>
@@ -777,7 +782,7 @@
       </p:grpSpPr>
       <p:sp>
         <p:nvSpPr>
-          <p:cNvPr id="44" name="PlaceHolder 1"/>
+          <p:cNvPr id="42" name="PlaceHolder 1"/>
           <p:cNvSpPr>
             <a:spLocks noGrp="1"/>
           </p:cNvSpPr>
@@ -787,8 +792,8 @@
         </p:nvSpPr>
         <p:spPr>
           <a:xfrm>
-            <a:off x="311760" y="444960"/>
-            <a:ext cx="8520120" cy="572400"/>
+            <a:off x="311760" y="418320"/>
+            <a:ext cx="8519760" cy="625320"/>
           </a:xfrm>
           <a:prstGeom prst="rect">
             <a:avLst/>
@@ -797,23 +802,24 @@
         <p:txBody>
           <a:bodyPr lIns="0" rIns="0" tIns="0" bIns="0" anchor="ctr"/>
           <a:p>
-            <a:endParaRPr b="0" lang="en-IN" sz="1400" spc="-1" strike="noStrike">
-              <a:solidFill>
-                <a:srgbClr val="000000"/>
-              </a:solidFill>
-              <a:uFill>
-                <a:solidFill>
-                  <a:srgbClr val="ffffff"/>
-                </a:solidFill>
-              </a:uFill>
-              <a:latin typeface="Arial"/>
-            </a:endParaRPr>
-          </a:p>
-        </p:txBody>
-      </p:sp>
-      <p:sp>
-        <p:nvSpPr>
-          <p:cNvPr id="45" name="PlaceHolder 2"/>
+            <a:pPr algn="ctr"/>
+            <a:endParaRPr b="0" lang="en-IN" sz="4400" spc="-1" strike="noStrike">
+              <a:solidFill>
+                <a:srgbClr val="000000"/>
+              </a:solidFill>
+              <a:uFill>
+                <a:solidFill>
+                  <a:srgbClr val="ffffff"/>
+                </a:solidFill>
+              </a:uFill>
+              <a:latin typeface="Arial"/>
+            </a:endParaRPr>
+          </a:p>
+        </p:txBody>
+      </p:sp>
+      <p:sp>
+        <p:nvSpPr>
+          <p:cNvPr id="43" name="PlaceHolder 2"/>
           <p:cNvSpPr>
             <a:spLocks noGrp="1"/>
           </p:cNvSpPr>
@@ -824,7 +830,7 @@
         <p:spPr>
           <a:xfrm>
             <a:off x="311760" y="1152360"/>
-            <a:ext cx="4157640" cy="3416040"/>
+            <a:ext cx="4157280" cy="3415680"/>
           </a:xfrm>
           <a:prstGeom prst="rect">
             <a:avLst/>
@@ -833,23 +839,23 @@
         <p:txBody>
           <a:bodyPr lIns="0" rIns="0" tIns="0" bIns="0"/>
           <a:p>
-            <a:endParaRPr b="0" lang="en-IN" sz="1400" spc="-1" strike="noStrike">
-              <a:solidFill>
-                <a:srgbClr val="000000"/>
-              </a:solidFill>
-              <a:uFill>
-                <a:solidFill>
-                  <a:srgbClr val="ffffff"/>
-                </a:solidFill>
-              </a:uFill>
-              <a:latin typeface="Arial"/>
-            </a:endParaRPr>
-          </a:p>
-        </p:txBody>
-      </p:sp>
-      <p:sp>
-        <p:nvSpPr>
-          <p:cNvPr id="46" name="PlaceHolder 3"/>
+            <a:endParaRPr b="0" lang="en-IN" sz="3200" spc="-1" strike="noStrike">
+              <a:solidFill>
+                <a:srgbClr val="000000"/>
+              </a:solidFill>
+              <a:uFill>
+                <a:solidFill>
+                  <a:srgbClr val="ffffff"/>
+                </a:solidFill>
+              </a:uFill>
+              <a:latin typeface="Arial"/>
+            </a:endParaRPr>
+          </a:p>
+        </p:txBody>
+      </p:sp>
+      <p:sp>
+        <p:nvSpPr>
+          <p:cNvPr id="44" name="PlaceHolder 3"/>
           <p:cNvSpPr>
             <a:spLocks noGrp="1"/>
           </p:cNvSpPr>
@@ -859,8 +865,8 @@
         </p:nvSpPr>
         <p:spPr>
           <a:xfrm>
-            <a:off x="4677840" y="1152360"/>
-            <a:ext cx="4157640" cy="3416040"/>
+            <a:off x="4677120" y="1152360"/>
+            <a:ext cx="4157280" cy="3415680"/>
           </a:xfrm>
           <a:prstGeom prst="rect">
             <a:avLst/>
@@ -869,7 +875,7 @@
         <p:txBody>
           <a:bodyPr lIns="0" rIns="0" tIns="0" bIns="0"/>
           <a:p>
-            <a:endParaRPr b="0" lang="en-IN" sz="1400" spc="-1" strike="noStrike">
+            <a:endParaRPr b="0" lang="en-IN" sz="3200" spc="-1" strike="noStrike">
               <a:solidFill>
                 <a:srgbClr val="000000"/>
               </a:solidFill>
@@ -907,7 +913,7 @@
       </p:grpSpPr>
       <p:sp>
         <p:nvSpPr>
-          <p:cNvPr id="47" name="PlaceHolder 1"/>
+          <p:cNvPr id="45" name="PlaceHolder 1"/>
           <p:cNvSpPr>
             <a:spLocks noGrp="1"/>
           </p:cNvSpPr>
@@ -917,8 +923,8 @@
         </p:nvSpPr>
         <p:spPr>
           <a:xfrm>
-            <a:off x="311760" y="444960"/>
-            <a:ext cx="8520120" cy="572400"/>
+            <a:off x="311760" y="418320"/>
+            <a:ext cx="8519760" cy="625320"/>
           </a:xfrm>
           <a:prstGeom prst="rect">
             <a:avLst/>
@@ -927,7 +933,8 @@
         <p:txBody>
           <a:bodyPr lIns="0" rIns="0" tIns="0" bIns="0" anchor="ctr"/>
           <a:p>
-            <a:endParaRPr b="0" lang="en-IN" sz="1400" spc="-1" strike="noStrike">
+            <a:pPr algn="ctr"/>
+            <a:endParaRPr b="0" lang="en-IN" sz="4400" spc="-1" strike="noStrike">
               <a:solidFill>
                 <a:srgbClr val="000000"/>
               </a:solidFill>
@@ -965,7 +972,7 @@
       </p:grpSpPr>
       <p:sp>
         <p:nvSpPr>
-          <p:cNvPr id="48" name="PlaceHolder 1"/>
+          <p:cNvPr id="46" name="PlaceHolder 1"/>
           <p:cNvSpPr>
             <a:spLocks noGrp="1"/>
           </p:cNvSpPr>
@@ -976,7 +983,7 @@
         <p:spPr>
           <a:xfrm>
             <a:off x="311760" y="444960"/>
-            <a:ext cx="8520120" cy="2654640"/>
+            <a:ext cx="8519760" cy="2652840"/>
           </a:xfrm>
           <a:prstGeom prst="rect">
             <a:avLst/>
@@ -1024,7 +1031,7 @@
       </p:grpSpPr>
       <p:sp>
         <p:nvSpPr>
-          <p:cNvPr id="49" name="PlaceHolder 1"/>
+          <p:cNvPr id="47" name="PlaceHolder 1"/>
           <p:cNvSpPr>
             <a:spLocks noGrp="1"/>
           </p:cNvSpPr>
@@ -1034,8 +1041,8 @@
         </p:nvSpPr>
         <p:spPr>
           <a:xfrm>
-            <a:off x="311760" y="444960"/>
-            <a:ext cx="8520120" cy="572400"/>
+            <a:off x="311760" y="418320"/>
+            <a:ext cx="8519760" cy="625320"/>
           </a:xfrm>
           <a:prstGeom prst="rect">
             <a:avLst/>
@@ -1044,23 +1051,24 @@
         <p:txBody>
           <a:bodyPr lIns="0" rIns="0" tIns="0" bIns="0" anchor="ctr"/>
           <a:p>
-            <a:endParaRPr b="0" lang="en-IN" sz="1400" spc="-1" strike="noStrike">
-              <a:solidFill>
-                <a:srgbClr val="000000"/>
-              </a:solidFill>
-              <a:uFill>
-                <a:solidFill>
-                  <a:srgbClr val="ffffff"/>
-                </a:solidFill>
-              </a:uFill>
-              <a:latin typeface="Arial"/>
-            </a:endParaRPr>
-          </a:p>
-        </p:txBody>
-      </p:sp>
-      <p:sp>
-        <p:nvSpPr>
-          <p:cNvPr id="50" name="PlaceHolder 2"/>
+            <a:pPr algn="ctr"/>
+            <a:endParaRPr b="0" lang="en-IN" sz="4400" spc="-1" strike="noStrike">
+              <a:solidFill>
+                <a:srgbClr val="000000"/>
+              </a:solidFill>
+              <a:uFill>
+                <a:solidFill>
+                  <a:srgbClr val="ffffff"/>
+                </a:solidFill>
+              </a:uFill>
+              <a:latin typeface="Arial"/>
+            </a:endParaRPr>
+          </a:p>
+        </p:txBody>
+      </p:sp>
+      <p:sp>
+        <p:nvSpPr>
+          <p:cNvPr id="48" name="PlaceHolder 2"/>
           <p:cNvSpPr>
             <a:spLocks noGrp="1"/>
           </p:cNvSpPr>
@@ -1071,7 +1079,7 @@
         <p:spPr>
           <a:xfrm>
             <a:off x="311760" y="1152360"/>
-            <a:ext cx="4157640" cy="1629360"/>
+            <a:ext cx="4157280" cy="1629000"/>
           </a:xfrm>
           <a:prstGeom prst="rect">
             <a:avLst/>
@@ -1080,23 +1088,23 @@
         <p:txBody>
           <a:bodyPr lIns="0" rIns="0" tIns="0" bIns="0"/>
           <a:p>
-            <a:endParaRPr b="0" lang="en-IN" sz="1400" spc="-1" strike="noStrike">
-              <a:solidFill>
-                <a:srgbClr val="000000"/>
-              </a:solidFill>
-              <a:uFill>
-                <a:solidFill>
-                  <a:srgbClr val="ffffff"/>
-                </a:solidFill>
-              </a:uFill>
-              <a:latin typeface="Arial"/>
-            </a:endParaRPr>
-          </a:p>
-        </p:txBody>
-      </p:sp>
-      <p:sp>
-        <p:nvSpPr>
-          <p:cNvPr id="51" name="PlaceHolder 3"/>
+            <a:endParaRPr b="0" lang="en-IN" sz="3200" spc="-1" strike="noStrike">
+              <a:solidFill>
+                <a:srgbClr val="000000"/>
+              </a:solidFill>
+              <a:uFill>
+                <a:solidFill>
+                  <a:srgbClr val="ffffff"/>
+                </a:solidFill>
+              </a:uFill>
+              <a:latin typeface="Arial"/>
+            </a:endParaRPr>
+          </a:p>
+        </p:txBody>
+      </p:sp>
+      <p:sp>
+        <p:nvSpPr>
+          <p:cNvPr id="49" name="PlaceHolder 3"/>
           <p:cNvSpPr>
             <a:spLocks noGrp="1"/>
           </p:cNvSpPr>
@@ -1106,8 +1114,8 @@
         </p:nvSpPr>
         <p:spPr>
           <a:xfrm>
-            <a:off x="311760" y="2936880"/>
-            <a:ext cx="4157640" cy="1629360"/>
+            <a:off x="311760" y="2936520"/>
+            <a:ext cx="4157280" cy="1629000"/>
           </a:xfrm>
           <a:prstGeom prst="rect">
             <a:avLst/>
@@ -1116,23 +1124,23 @@
         <p:txBody>
           <a:bodyPr lIns="0" rIns="0" tIns="0" bIns="0"/>
           <a:p>
-            <a:endParaRPr b="0" lang="en-IN" sz="1400" spc="-1" strike="noStrike">
-              <a:solidFill>
-                <a:srgbClr val="000000"/>
-              </a:solidFill>
-              <a:uFill>
-                <a:solidFill>
-                  <a:srgbClr val="ffffff"/>
-                </a:solidFill>
-              </a:uFill>
-              <a:latin typeface="Arial"/>
-            </a:endParaRPr>
-          </a:p>
-        </p:txBody>
-      </p:sp>
-      <p:sp>
-        <p:nvSpPr>
-          <p:cNvPr id="52" name="PlaceHolder 4"/>
+            <a:endParaRPr b="0" lang="en-IN" sz="3200" spc="-1" strike="noStrike">
+              <a:solidFill>
+                <a:srgbClr val="000000"/>
+              </a:solidFill>
+              <a:uFill>
+                <a:solidFill>
+                  <a:srgbClr val="ffffff"/>
+                </a:solidFill>
+              </a:uFill>
+              <a:latin typeface="Arial"/>
+            </a:endParaRPr>
+          </a:p>
+        </p:txBody>
+      </p:sp>
+      <p:sp>
+        <p:nvSpPr>
+          <p:cNvPr id="50" name="PlaceHolder 4"/>
           <p:cNvSpPr>
             <a:spLocks noGrp="1"/>
           </p:cNvSpPr>
@@ -1142,8 +1150,8 @@
         </p:nvSpPr>
         <p:spPr>
           <a:xfrm>
-            <a:off x="4677840" y="1152360"/>
-            <a:ext cx="4157640" cy="3416040"/>
+            <a:off x="4677120" y="1152360"/>
+            <a:ext cx="4157280" cy="3415680"/>
           </a:xfrm>
           <a:prstGeom prst="rect">
             <a:avLst/>
@@ -1152,7 +1160,7 @@
         <p:txBody>
           <a:bodyPr lIns="0" rIns="0" tIns="0" bIns="0"/>
           <a:p>
-            <a:endParaRPr b="0" lang="en-IN" sz="1400" spc="-1" strike="noStrike">
+            <a:endParaRPr b="0" lang="en-IN" sz="3200" spc="-1" strike="noStrike">
               <a:solidFill>
                 <a:srgbClr val="000000"/>
               </a:solidFill>
@@ -1190,7 +1198,7 @@
       </p:grpSpPr>
       <p:sp>
         <p:nvSpPr>
-          <p:cNvPr id="3" name="PlaceHolder 1"/>
+          <p:cNvPr id="2" name="PlaceHolder 1"/>
           <p:cNvSpPr>
             <a:spLocks noGrp="1"/>
           </p:cNvSpPr>
@@ -1200,8 +1208,8 @@
         </p:nvSpPr>
         <p:spPr>
           <a:xfrm>
-            <a:off x="311760" y="444960"/>
-            <a:ext cx="8520120" cy="572400"/>
+            <a:off x="311760" y="418320"/>
+            <a:ext cx="8519760" cy="625320"/>
           </a:xfrm>
           <a:prstGeom prst="rect">
             <a:avLst/>
@@ -1210,23 +1218,24 @@
         <p:txBody>
           <a:bodyPr lIns="0" rIns="0" tIns="0" bIns="0" anchor="ctr"/>
           <a:p>
-            <a:endParaRPr b="0" lang="en-IN" sz="1400" spc="-1" strike="noStrike">
-              <a:solidFill>
-                <a:srgbClr val="000000"/>
-              </a:solidFill>
-              <a:uFill>
-                <a:solidFill>
-                  <a:srgbClr val="ffffff"/>
-                </a:solidFill>
-              </a:uFill>
-              <a:latin typeface="Arial"/>
-            </a:endParaRPr>
-          </a:p>
-        </p:txBody>
-      </p:sp>
-      <p:sp>
-        <p:nvSpPr>
-          <p:cNvPr id="4" name="PlaceHolder 2"/>
+            <a:pPr algn="ctr"/>
+            <a:endParaRPr b="0" lang="en-IN" sz="4400" spc="-1" strike="noStrike">
+              <a:solidFill>
+                <a:srgbClr val="000000"/>
+              </a:solidFill>
+              <a:uFill>
+                <a:solidFill>
+                  <a:srgbClr val="ffffff"/>
+                </a:solidFill>
+              </a:uFill>
+              <a:latin typeface="Arial"/>
+            </a:endParaRPr>
+          </a:p>
+        </p:txBody>
+      </p:sp>
+      <p:sp>
+        <p:nvSpPr>
+          <p:cNvPr id="3" name="PlaceHolder 2"/>
           <p:cNvSpPr>
             <a:spLocks noGrp="1"/>
           </p:cNvSpPr>
@@ -1237,7 +1246,7 @@
         <p:spPr>
           <a:xfrm>
             <a:off x="311760" y="1152360"/>
-            <a:ext cx="8520120" cy="3416040"/>
+            <a:ext cx="8519760" cy="3415680"/>
           </a:xfrm>
           <a:prstGeom prst="rect">
             <a:avLst/>
@@ -1285,7 +1294,7 @@
       </p:grpSpPr>
       <p:sp>
         <p:nvSpPr>
-          <p:cNvPr id="53" name="PlaceHolder 1"/>
+          <p:cNvPr id="51" name="PlaceHolder 1"/>
           <p:cNvSpPr>
             <a:spLocks noGrp="1"/>
           </p:cNvSpPr>
@@ -1295,8 +1304,8 @@
         </p:nvSpPr>
         <p:spPr>
           <a:xfrm>
-            <a:off x="311760" y="444960"/>
-            <a:ext cx="8520120" cy="572400"/>
+            <a:off x="311760" y="418320"/>
+            <a:ext cx="8519760" cy="625320"/>
           </a:xfrm>
           <a:prstGeom prst="rect">
             <a:avLst/>
@@ -1305,23 +1314,24 @@
         <p:txBody>
           <a:bodyPr lIns="0" rIns="0" tIns="0" bIns="0" anchor="ctr"/>
           <a:p>
-            <a:endParaRPr b="0" lang="en-IN" sz="1400" spc="-1" strike="noStrike">
-              <a:solidFill>
-                <a:srgbClr val="000000"/>
-              </a:solidFill>
-              <a:uFill>
-                <a:solidFill>
-                  <a:srgbClr val="ffffff"/>
-                </a:solidFill>
-              </a:uFill>
-              <a:latin typeface="Arial"/>
-            </a:endParaRPr>
-          </a:p>
-        </p:txBody>
-      </p:sp>
-      <p:sp>
-        <p:nvSpPr>
-          <p:cNvPr id="54" name="PlaceHolder 2"/>
+            <a:pPr algn="ctr"/>
+            <a:endParaRPr b="0" lang="en-IN" sz="4400" spc="-1" strike="noStrike">
+              <a:solidFill>
+                <a:srgbClr val="000000"/>
+              </a:solidFill>
+              <a:uFill>
+                <a:solidFill>
+                  <a:srgbClr val="ffffff"/>
+                </a:solidFill>
+              </a:uFill>
+              <a:latin typeface="Arial"/>
+            </a:endParaRPr>
+          </a:p>
+        </p:txBody>
+      </p:sp>
+      <p:sp>
+        <p:nvSpPr>
+          <p:cNvPr id="52" name="PlaceHolder 2"/>
           <p:cNvSpPr>
             <a:spLocks noGrp="1"/>
           </p:cNvSpPr>
@@ -1332,7 +1342,7 @@
         <p:spPr>
           <a:xfrm>
             <a:off x="311760" y="1152360"/>
-            <a:ext cx="4157640" cy="3416040"/>
+            <a:ext cx="4157280" cy="3415680"/>
           </a:xfrm>
           <a:prstGeom prst="rect">
             <a:avLst/>
@@ -1341,23 +1351,23 @@
         <p:txBody>
           <a:bodyPr lIns="0" rIns="0" tIns="0" bIns="0"/>
           <a:p>
-            <a:endParaRPr b="0" lang="en-IN" sz="1400" spc="-1" strike="noStrike">
-              <a:solidFill>
-                <a:srgbClr val="000000"/>
-              </a:solidFill>
-              <a:uFill>
-                <a:solidFill>
-                  <a:srgbClr val="ffffff"/>
-                </a:solidFill>
-              </a:uFill>
-              <a:latin typeface="Arial"/>
-            </a:endParaRPr>
-          </a:p>
-        </p:txBody>
-      </p:sp>
-      <p:sp>
-        <p:nvSpPr>
-          <p:cNvPr id="55" name="PlaceHolder 3"/>
+            <a:endParaRPr b="0" lang="en-IN" sz="3200" spc="-1" strike="noStrike">
+              <a:solidFill>
+                <a:srgbClr val="000000"/>
+              </a:solidFill>
+              <a:uFill>
+                <a:solidFill>
+                  <a:srgbClr val="ffffff"/>
+                </a:solidFill>
+              </a:uFill>
+              <a:latin typeface="Arial"/>
+            </a:endParaRPr>
+          </a:p>
+        </p:txBody>
+      </p:sp>
+      <p:sp>
+        <p:nvSpPr>
+          <p:cNvPr id="53" name="PlaceHolder 3"/>
           <p:cNvSpPr>
             <a:spLocks noGrp="1"/>
           </p:cNvSpPr>
@@ -1367,8 +1377,8 @@
         </p:nvSpPr>
         <p:spPr>
           <a:xfrm>
-            <a:off x="4677840" y="1152360"/>
-            <a:ext cx="4157640" cy="1629360"/>
+            <a:off x="4677120" y="1152360"/>
+            <a:ext cx="4157280" cy="1629000"/>
           </a:xfrm>
           <a:prstGeom prst="rect">
             <a:avLst/>
@@ -1377,23 +1387,23 @@
         <p:txBody>
           <a:bodyPr lIns="0" rIns="0" tIns="0" bIns="0"/>
           <a:p>
-            <a:endParaRPr b="0" lang="en-IN" sz="1400" spc="-1" strike="noStrike">
-              <a:solidFill>
-                <a:srgbClr val="000000"/>
-              </a:solidFill>
-              <a:uFill>
-                <a:solidFill>
-                  <a:srgbClr val="ffffff"/>
-                </a:solidFill>
-              </a:uFill>
-              <a:latin typeface="Arial"/>
-            </a:endParaRPr>
-          </a:p>
-        </p:txBody>
-      </p:sp>
-      <p:sp>
-        <p:nvSpPr>
-          <p:cNvPr id="56" name="PlaceHolder 4"/>
+            <a:endParaRPr b="0" lang="en-IN" sz="3200" spc="-1" strike="noStrike">
+              <a:solidFill>
+                <a:srgbClr val="000000"/>
+              </a:solidFill>
+              <a:uFill>
+                <a:solidFill>
+                  <a:srgbClr val="ffffff"/>
+                </a:solidFill>
+              </a:uFill>
+              <a:latin typeface="Arial"/>
+            </a:endParaRPr>
+          </a:p>
+        </p:txBody>
+      </p:sp>
+      <p:sp>
+        <p:nvSpPr>
+          <p:cNvPr id="54" name="PlaceHolder 4"/>
           <p:cNvSpPr>
             <a:spLocks noGrp="1"/>
           </p:cNvSpPr>
@@ -1403,8 +1413,8 @@
         </p:nvSpPr>
         <p:spPr>
           <a:xfrm>
-            <a:off x="4677840" y="2936880"/>
-            <a:ext cx="4157640" cy="1629360"/>
+            <a:off x="4677120" y="2936520"/>
+            <a:ext cx="4157280" cy="1629000"/>
           </a:xfrm>
           <a:prstGeom prst="rect">
             <a:avLst/>
@@ -1413,7 +1423,7 @@
         <p:txBody>
           <a:bodyPr lIns="0" rIns="0" tIns="0" bIns="0"/>
           <a:p>
-            <a:endParaRPr b="0" lang="en-IN" sz="1400" spc="-1" strike="noStrike">
+            <a:endParaRPr b="0" lang="en-IN" sz="3200" spc="-1" strike="noStrike">
               <a:solidFill>
                 <a:srgbClr val="000000"/>
               </a:solidFill>
@@ -1451,7 +1461,7 @@
       </p:grpSpPr>
       <p:sp>
         <p:nvSpPr>
-          <p:cNvPr id="57" name="PlaceHolder 1"/>
+          <p:cNvPr id="55" name="PlaceHolder 1"/>
           <p:cNvSpPr>
             <a:spLocks noGrp="1"/>
           </p:cNvSpPr>
@@ -1461,8 +1471,8 @@
         </p:nvSpPr>
         <p:spPr>
           <a:xfrm>
-            <a:off x="311760" y="444960"/>
-            <a:ext cx="8520120" cy="572400"/>
+            <a:off x="311760" y="418320"/>
+            <a:ext cx="8519760" cy="625320"/>
           </a:xfrm>
           <a:prstGeom prst="rect">
             <a:avLst/>
@@ -1471,23 +1481,24 @@
         <p:txBody>
           <a:bodyPr lIns="0" rIns="0" tIns="0" bIns="0" anchor="ctr"/>
           <a:p>
-            <a:endParaRPr b="0" lang="en-IN" sz="1400" spc="-1" strike="noStrike">
-              <a:solidFill>
-                <a:srgbClr val="000000"/>
-              </a:solidFill>
-              <a:uFill>
-                <a:solidFill>
-                  <a:srgbClr val="ffffff"/>
-                </a:solidFill>
-              </a:uFill>
-              <a:latin typeface="Arial"/>
-            </a:endParaRPr>
-          </a:p>
-        </p:txBody>
-      </p:sp>
-      <p:sp>
-        <p:nvSpPr>
-          <p:cNvPr id="58" name="PlaceHolder 2"/>
+            <a:pPr algn="ctr"/>
+            <a:endParaRPr b="0" lang="en-IN" sz="4400" spc="-1" strike="noStrike">
+              <a:solidFill>
+                <a:srgbClr val="000000"/>
+              </a:solidFill>
+              <a:uFill>
+                <a:solidFill>
+                  <a:srgbClr val="ffffff"/>
+                </a:solidFill>
+              </a:uFill>
+              <a:latin typeface="Arial"/>
+            </a:endParaRPr>
+          </a:p>
+        </p:txBody>
+      </p:sp>
+      <p:sp>
+        <p:nvSpPr>
+          <p:cNvPr id="56" name="PlaceHolder 2"/>
           <p:cNvSpPr>
             <a:spLocks noGrp="1"/>
           </p:cNvSpPr>
@@ -1498,7 +1509,7 @@
         <p:spPr>
           <a:xfrm>
             <a:off x="311760" y="1152360"/>
-            <a:ext cx="4157640" cy="1629360"/>
+            <a:ext cx="4157280" cy="1629000"/>
           </a:xfrm>
           <a:prstGeom prst="rect">
             <a:avLst/>
@@ -1507,23 +1518,23 @@
         <p:txBody>
           <a:bodyPr lIns="0" rIns="0" tIns="0" bIns="0"/>
           <a:p>
-            <a:endParaRPr b="0" lang="en-IN" sz="1400" spc="-1" strike="noStrike">
-              <a:solidFill>
-                <a:srgbClr val="000000"/>
-              </a:solidFill>
-              <a:uFill>
-                <a:solidFill>
-                  <a:srgbClr val="ffffff"/>
-                </a:solidFill>
-              </a:uFill>
-              <a:latin typeface="Arial"/>
-            </a:endParaRPr>
-          </a:p>
-        </p:txBody>
-      </p:sp>
-      <p:sp>
-        <p:nvSpPr>
-          <p:cNvPr id="59" name="PlaceHolder 3"/>
+            <a:endParaRPr b="0" lang="en-IN" sz="3200" spc="-1" strike="noStrike">
+              <a:solidFill>
+                <a:srgbClr val="000000"/>
+              </a:solidFill>
+              <a:uFill>
+                <a:solidFill>
+                  <a:srgbClr val="ffffff"/>
+                </a:solidFill>
+              </a:uFill>
+              <a:latin typeface="Arial"/>
+            </a:endParaRPr>
+          </a:p>
+        </p:txBody>
+      </p:sp>
+      <p:sp>
+        <p:nvSpPr>
+          <p:cNvPr id="57" name="PlaceHolder 3"/>
           <p:cNvSpPr>
             <a:spLocks noGrp="1"/>
           </p:cNvSpPr>
@@ -1533,8 +1544,8 @@
         </p:nvSpPr>
         <p:spPr>
           <a:xfrm>
-            <a:off x="4677840" y="1152360"/>
-            <a:ext cx="4157640" cy="1629360"/>
+            <a:off x="4677120" y="1152360"/>
+            <a:ext cx="4157280" cy="1629000"/>
           </a:xfrm>
           <a:prstGeom prst="rect">
             <a:avLst/>
@@ -1543,23 +1554,23 @@
         <p:txBody>
           <a:bodyPr lIns="0" rIns="0" tIns="0" bIns="0"/>
           <a:p>
-            <a:endParaRPr b="0" lang="en-IN" sz="1400" spc="-1" strike="noStrike">
-              <a:solidFill>
-                <a:srgbClr val="000000"/>
-              </a:solidFill>
-              <a:uFill>
-                <a:solidFill>
-                  <a:srgbClr val="ffffff"/>
-                </a:solidFill>
-              </a:uFill>
-              <a:latin typeface="Arial"/>
-            </a:endParaRPr>
-          </a:p>
-        </p:txBody>
-      </p:sp>
-      <p:sp>
-        <p:nvSpPr>
-          <p:cNvPr id="60" name="PlaceHolder 4"/>
+            <a:endParaRPr b="0" lang="en-IN" sz="3200" spc="-1" strike="noStrike">
+              <a:solidFill>
+                <a:srgbClr val="000000"/>
+              </a:solidFill>
+              <a:uFill>
+                <a:solidFill>
+                  <a:srgbClr val="ffffff"/>
+                </a:solidFill>
+              </a:uFill>
+              <a:latin typeface="Arial"/>
+            </a:endParaRPr>
+          </a:p>
+        </p:txBody>
+      </p:sp>
+      <p:sp>
+        <p:nvSpPr>
+          <p:cNvPr id="58" name="PlaceHolder 4"/>
           <p:cNvSpPr>
             <a:spLocks noGrp="1"/>
           </p:cNvSpPr>
@@ -1569,8 +1580,8 @@
         </p:nvSpPr>
         <p:spPr>
           <a:xfrm>
-            <a:off x="311760" y="2936880"/>
-            <a:ext cx="8520120" cy="1629360"/>
+            <a:off x="311760" y="2936520"/>
+            <a:ext cx="8519760" cy="1629000"/>
           </a:xfrm>
           <a:prstGeom prst="rect">
             <a:avLst/>
@@ -1579,7 +1590,7 @@
         <p:txBody>
           <a:bodyPr lIns="0" rIns="0" tIns="0" bIns="0"/>
           <a:p>
-            <a:endParaRPr b="0" lang="en-IN" sz="1400" spc="-1" strike="noStrike">
+            <a:endParaRPr b="0" lang="en-IN" sz="3200" spc="-1" strike="noStrike">
               <a:solidFill>
                 <a:srgbClr val="000000"/>
               </a:solidFill>
@@ -1617,7 +1628,7 @@
       </p:grpSpPr>
       <p:sp>
         <p:nvSpPr>
-          <p:cNvPr id="61" name="PlaceHolder 1"/>
+          <p:cNvPr id="59" name="PlaceHolder 1"/>
           <p:cNvSpPr>
             <a:spLocks noGrp="1"/>
           </p:cNvSpPr>
@@ -1627,8 +1638,8 @@
         </p:nvSpPr>
         <p:spPr>
           <a:xfrm>
-            <a:off x="311760" y="444960"/>
-            <a:ext cx="8520120" cy="572400"/>
+            <a:off x="311760" y="418320"/>
+            <a:ext cx="8519760" cy="625320"/>
           </a:xfrm>
           <a:prstGeom prst="rect">
             <a:avLst/>
@@ -1637,23 +1648,24 @@
         <p:txBody>
           <a:bodyPr lIns="0" rIns="0" tIns="0" bIns="0" anchor="ctr"/>
           <a:p>
-            <a:endParaRPr b="0" lang="en-IN" sz="1400" spc="-1" strike="noStrike">
-              <a:solidFill>
-                <a:srgbClr val="000000"/>
-              </a:solidFill>
-              <a:uFill>
-                <a:solidFill>
-                  <a:srgbClr val="ffffff"/>
-                </a:solidFill>
-              </a:uFill>
-              <a:latin typeface="Arial"/>
-            </a:endParaRPr>
-          </a:p>
-        </p:txBody>
-      </p:sp>
-      <p:sp>
-        <p:nvSpPr>
-          <p:cNvPr id="62" name="PlaceHolder 2"/>
+            <a:pPr algn="ctr"/>
+            <a:endParaRPr b="0" lang="en-IN" sz="4400" spc="-1" strike="noStrike">
+              <a:solidFill>
+                <a:srgbClr val="000000"/>
+              </a:solidFill>
+              <a:uFill>
+                <a:solidFill>
+                  <a:srgbClr val="ffffff"/>
+                </a:solidFill>
+              </a:uFill>
+              <a:latin typeface="Arial"/>
+            </a:endParaRPr>
+          </a:p>
+        </p:txBody>
+      </p:sp>
+      <p:sp>
+        <p:nvSpPr>
+          <p:cNvPr id="60" name="PlaceHolder 2"/>
           <p:cNvSpPr>
             <a:spLocks noGrp="1"/>
           </p:cNvSpPr>
@@ -1664,7 +1676,7 @@
         <p:spPr>
           <a:xfrm>
             <a:off x="311760" y="1152360"/>
-            <a:ext cx="8520120" cy="1629360"/>
+            <a:ext cx="8519760" cy="1629000"/>
           </a:xfrm>
           <a:prstGeom prst="rect">
             <a:avLst/>
@@ -1673,23 +1685,23 @@
         <p:txBody>
           <a:bodyPr lIns="0" rIns="0" tIns="0" bIns="0"/>
           <a:p>
-            <a:endParaRPr b="0" lang="en-IN" sz="1400" spc="-1" strike="noStrike">
-              <a:solidFill>
-                <a:srgbClr val="000000"/>
-              </a:solidFill>
-              <a:uFill>
-                <a:solidFill>
-                  <a:srgbClr val="ffffff"/>
-                </a:solidFill>
-              </a:uFill>
-              <a:latin typeface="Arial"/>
-            </a:endParaRPr>
-          </a:p>
-        </p:txBody>
-      </p:sp>
-      <p:sp>
-        <p:nvSpPr>
-          <p:cNvPr id="63" name="PlaceHolder 3"/>
+            <a:endParaRPr b="0" lang="en-IN" sz="3200" spc="-1" strike="noStrike">
+              <a:solidFill>
+                <a:srgbClr val="000000"/>
+              </a:solidFill>
+              <a:uFill>
+                <a:solidFill>
+                  <a:srgbClr val="ffffff"/>
+                </a:solidFill>
+              </a:uFill>
+              <a:latin typeface="Arial"/>
+            </a:endParaRPr>
+          </a:p>
+        </p:txBody>
+      </p:sp>
+      <p:sp>
+        <p:nvSpPr>
+          <p:cNvPr id="61" name="PlaceHolder 3"/>
           <p:cNvSpPr>
             <a:spLocks noGrp="1"/>
           </p:cNvSpPr>
@@ -1699,8 +1711,8 @@
         </p:nvSpPr>
         <p:spPr>
           <a:xfrm>
-            <a:off x="311760" y="2936880"/>
-            <a:ext cx="8520120" cy="1629360"/>
+            <a:off x="311760" y="2936520"/>
+            <a:ext cx="8519760" cy="1629000"/>
           </a:xfrm>
           <a:prstGeom prst="rect">
             <a:avLst/>
@@ -1709,7 +1721,7 @@
         <p:txBody>
           <a:bodyPr lIns="0" rIns="0" tIns="0" bIns="0"/>
           <a:p>
-            <a:endParaRPr b="0" lang="en-IN" sz="1400" spc="-1" strike="noStrike">
+            <a:endParaRPr b="0" lang="en-IN" sz="3200" spc="-1" strike="noStrike">
               <a:solidFill>
                 <a:srgbClr val="000000"/>
               </a:solidFill>
@@ -1747,7 +1759,7 @@
       </p:grpSpPr>
       <p:sp>
         <p:nvSpPr>
-          <p:cNvPr id="64" name="PlaceHolder 1"/>
+          <p:cNvPr id="62" name="PlaceHolder 1"/>
           <p:cNvSpPr>
             <a:spLocks noGrp="1"/>
           </p:cNvSpPr>
@@ -1757,8 +1769,8 @@
         </p:nvSpPr>
         <p:spPr>
           <a:xfrm>
-            <a:off x="311760" y="444960"/>
-            <a:ext cx="8520120" cy="572400"/>
+            <a:off x="311760" y="418320"/>
+            <a:ext cx="8519760" cy="625320"/>
           </a:xfrm>
           <a:prstGeom prst="rect">
             <a:avLst/>
@@ -1767,23 +1779,24 @@
         <p:txBody>
           <a:bodyPr lIns="0" rIns="0" tIns="0" bIns="0" anchor="ctr"/>
           <a:p>
-            <a:endParaRPr b="0" lang="en-IN" sz="1400" spc="-1" strike="noStrike">
-              <a:solidFill>
-                <a:srgbClr val="000000"/>
-              </a:solidFill>
-              <a:uFill>
-                <a:solidFill>
-                  <a:srgbClr val="ffffff"/>
-                </a:solidFill>
-              </a:uFill>
-              <a:latin typeface="Arial"/>
-            </a:endParaRPr>
-          </a:p>
-        </p:txBody>
-      </p:sp>
-      <p:sp>
-        <p:nvSpPr>
-          <p:cNvPr id="65" name="PlaceHolder 2"/>
+            <a:pPr algn="ctr"/>
+            <a:endParaRPr b="0" lang="en-IN" sz="4400" spc="-1" strike="noStrike">
+              <a:solidFill>
+                <a:srgbClr val="000000"/>
+              </a:solidFill>
+              <a:uFill>
+                <a:solidFill>
+                  <a:srgbClr val="ffffff"/>
+                </a:solidFill>
+              </a:uFill>
+              <a:latin typeface="Arial"/>
+            </a:endParaRPr>
+          </a:p>
+        </p:txBody>
+      </p:sp>
+      <p:sp>
+        <p:nvSpPr>
+          <p:cNvPr id="63" name="PlaceHolder 2"/>
           <p:cNvSpPr>
             <a:spLocks noGrp="1"/>
           </p:cNvSpPr>
@@ -1794,7 +1807,7 @@
         <p:spPr>
           <a:xfrm>
             <a:off x="311760" y="1152360"/>
-            <a:ext cx="4157640" cy="1629360"/>
+            <a:ext cx="4157280" cy="1629000"/>
           </a:xfrm>
           <a:prstGeom prst="rect">
             <a:avLst/>
@@ -1803,23 +1816,23 @@
         <p:txBody>
           <a:bodyPr lIns="0" rIns="0" tIns="0" bIns="0"/>
           <a:p>
-            <a:endParaRPr b="0" lang="en-IN" sz="1400" spc="-1" strike="noStrike">
-              <a:solidFill>
-                <a:srgbClr val="000000"/>
-              </a:solidFill>
-              <a:uFill>
-                <a:solidFill>
-                  <a:srgbClr val="ffffff"/>
-                </a:solidFill>
-              </a:uFill>
-              <a:latin typeface="Arial"/>
-            </a:endParaRPr>
-          </a:p>
-        </p:txBody>
-      </p:sp>
-      <p:sp>
-        <p:nvSpPr>
-          <p:cNvPr id="66" name="PlaceHolder 3"/>
+            <a:endParaRPr b="0" lang="en-IN" sz="3200" spc="-1" strike="noStrike">
+              <a:solidFill>
+                <a:srgbClr val="000000"/>
+              </a:solidFill>
+              <a:uFill>
+                <a:solidFill>
+                  <a:srgbClr val="ffffff"/>
+                </a:solidFill>
+              </a:uFill>
+              <a:latin typeface="Arial"/>
+            </a:endParaRPr>
+          </a:p>
+        </p:txBody>
+      </p:sp>
+      <p:sp>
+        <p:nvSpPr>
+          <p:cNvPr id="64" name="PlaceHolder 3"/>
           <p:cNvSpPr>
             <a:spLocks noGrp="1"/>
           </p:cNvSpPr>
@@ -1829,8 +1842,8 @@
         </p:nvSpPr>
         <p:spPr>
           <a:xfrm>
-            <a:off x="4677840" y="1152360"/>
-            <a:ext cx="4157640" cy="1629360"/>
+            <a:off x="4677120" y="1152360"/>
+            <a:ext cx="4157280" cy="1629000"/>
           </a:xfrm>
           <a:prstGeom prst="rect">
             <a:avLst/>
@@ -1839,23 +1852,23 @@
         <p:txBody>
           <a:bodyPr lIns="0" rIns="0" tIns="0" bIns="0"/>
           <a:p>
-            <a:endParaRPr b="0" lang="en-IN" sz="1400" spc="-1" strike="noStrike">
-              <a:solidFill>
-                <a:srgbClr val="000000"/>
-              </a:solidFill>
-              <a:uFill>
-                <a:solidFill>
-                  <a:srgbClr val="ffffff"/>
-                </a:solidFill>
-              </a:uFill>
-              <a:latin typeface="Arial"/>
-            </a:endParaRPr>
-          </a:p>
-        </p:txBody>
-      </p:sp>
-      <p:sp>
-        <p:nvSpPr>
-          <p:cNvPr id="67" name="PlaceHolder 4"/>
+            <a:endParaRPr b="0" lang="en-IN" sz="3200" spc="-1" strike="noStrike">
+              <a:solidFill>
+                <a:srgbClr val="000000"/>
+              </a:solidFill>
+              <a:uFill>
+                <a:solidFill>
+                  <a:srgbClr val="ffffff"/>
+                </a:solidFill>
+              </a:uFill>
+              <a:latin typeface="Arial"/>
+            </a:endParaRPr>
+          </a:p>
+        </p:txBody>
+      </p:sp>
+      <p:sp>
+        <p:nvSpPr>
+          <p:cNvPr id="65" name="PlaceHolder 4"/>
           <p:cNvSpPr>
             <a:spLocks noGrp="1"/>
           </p:cNvSpPr>
@@ -1865,8 +1878,8 @@
         </p:nvSpPr>
         <p:spPr>
           <a:xfrm>
-            <a:off x="4677840" y="2936880"/>
-            <a:ext cx="4157640" cy="1629360"/>
+            <a:off x="4677120" y="2936520"/>
+            <a:ext cx="4157280" cy="1629000"/>
           </a:xfrm>
           <a:prstGeom prst="rect">
             <a:avLst/>
@@ -1875,23 +1888,23 @@
         <p:txBody>
           <a:bodyPr lIns="0" rIns="0" tIns="0" bIns="0"/>
           <a:p>
-            <a:endParaRPr b="0" lang="en-IN" sz="1400" spc="-1" strike="noStrike">
-              <a:solidFill>
-                <a:srgbClr val="000000"/>
-              </a:solidFill>
-              <a:uFill>
-                <a:solidFill>
-                  <a:srgbClr val="ffffff"/>
-                </a:solidFill>
-              </a:uFill>
-              <a:latin typeface="Arial"/>
-            </a:endParaRPr>
-          </a:p>
-        </p:txBody>
-      </p:sp>
-      <p:sp>
-        <p:nvSpPr>
-          <p:cNvPr id="68" name="PlaceHolder 5"/>
+            <a:endParaRPr b="0" lang="en-IN" sz="3200" spc="-1" strike="noStrike">
+              <a:solidFill>
+                <a:srgbClr val="000000"/>
+              </a:solidFill>
+              <a:uFill>
+                <a:solidFill>
+                  <a:srgbClr val="ffffff"/>
+                </a:solidFill>
+              </a:uFill>
+              <a:latin typeface="Arial"/>
+            </a:endParaRPr>
+          </a:p>
+        </p:txBody>
+      </p:sp>
+      <p:sp>
+        <p:nvSpPr>
+          <p:cNvPr id="66" name="PlaceHolder 5"/>
           <p:cNvSpPr>
             <a:spLocks noGrp="1"/>
           </p:cNvSpPr>
@@ -1901,8 +1914,8 @@
         </p:nvSpPr>
         <p:spPr>
           <a:xfrm>
-            <a:off x="311760" y="2936880"/>
-            <a:ext cx="4157640" cy="1629360"/>
+            <a:off x="311760" y="2936520"/>
+            <a:ext cx="4157280" cy="1629000"/>
           </a:xfrm>
           <a:prstGeom prst="rect">
             <a:avLst/>
@@ -1911,7 +1924,7 @@
         <p:txBody>
           <a:bodyPr lIns="0" rIns="0" tIns="0" bIns="0"/>
           <a:p>
-            <a:endParaRPr b="0" lang="en-IN" sz="1400" spc="-1" strike="noStrike">
+            <a:endParaRPr b="0" lang="en-IN" sz="3200" spc="-1" strike="noStrike">
               <a:solidFill>
                 <a:srgbClr val="000000"/>
               </a:solidFill>
@@ -1949,7 +1962,7 @@
       </p:grpSpPr>
       <p:sp>
         <p:nvSpPr>
-          <p:cNvPr id="69" name="PlaceHolder 1"/>
+          <p:cNvPr id="67" name="PlaceHolder 1"/>
           <p:cNvSpPr>
             <a:spLocks noGrp="1"/>
           </p:cNvSpPr>
@@ -1959,8 +1972,8 @@
         </p:nvSpPr>
         <p:spPr>
           <a:xfrm>
-            <a:off x="311760" y="444960"/>
-            <a:ext cx="8520120" cy="572400"/>
+            <a:off x="311760" y="418320"/>
+            <a:ext cx="8519760" cy="625320"/>
           </a:xfrm>
           <a:prstGeom prst="rect">
             <a:avLst/>
@@ -1969,23 +1982,24 @@
         <p:txBody>
           <a:bodyPr lIns="0" rIns="0" tIns="0" bIns="0" anchor="ctr"/>
           <a:p>
-            <a:endParaRPr b="0" lang="en-IN" sz="1400" spc="-1" strike="noStrike">
-              <a:solidFill>
-                <a:srgbClr val="000000"/>
-              </a:solidFill>
-              <a:uFill>
-                <a:solidFill>
-                  <a:srgbClr val="ffffff"/>
-                </a:solidFill>
-              </a:uFill>
-              <a:latin typeface="Arial"/>
-            </a:endParaRPr>
-          </a:p>
-        </p:txBody>
-      </p:sp>
-      <p:sp>
-        <p:nvSpPr>
-          <p:cNvPr id="70" name="PlaceHolder 2"/>
+            <a:pPr algn="ctr"/>
+            <a:endParaRPr b="0" lang="en-IN" sz="4400" spc="-1" strike="noStrike">
+              <a:solidFill>
+                <a:srgbClr val="000000"/>
+              </a:solidFill>
+              <a:uFill>
+                <a:solidFill>
+                  <a:srgbClr val="ffffff"/>
+                </a:solidFill>
+              </a:uFill>
+              <a:latin typeface="Arial"/>
+            </a:endParaRPr>
+          </a:p>
+        </p:txBody>
+      </p:sp>
+      <p:sp>
+        <p:nvSpPr>
+          <p:cNvPr id="68" name="PlaceHolder 2"/>
           <p:cNvSpPr>
             <a:spLocks noGrp="1"/>
           </p:cNvSpPr>
@@ -1996,7 +2010,7 @@
         <p:spPr>
           <a:xfrm>
             <a:off x="311760" y="1152360"/>
-            <a:ext cx="8520120" cy="3416040"/>
+            <a:ext cx="8519760" cy="3415680"/>
           </a:xfrm>
           <a:prstGeom prst="rect">
             <a:avLst/>
@@ -2005,23 +2019,23 @@
         <p:txBody>
           <a:bodyPr lIns="0" rIns="0" tIns="0" bIns="0"/>
           <a:p>
-            <a:endParaRPr b="0" lang="en-IN" sz="1400" spc="-1" strike="noStrike">
-              <a:solidFill>
-                <a:srgbClr val="000000"/>
-              </a:solidFill>
-              <a:uFill>
-                <a:solidFill>
-                  <a:srgbClr val="ffffff"/>
-                </a:solidFill>
-              </a:uFill>
-              <a:latin typeface="Arial"/>
-            </a:endParaRPr>
-          </a:p>
-        </p:txBody>
-      </p:sp>
-      <p:sp>
-        <p:nvSpPr>
-          <p:cNvPr id="71" name="PlaceHolder 3"/>
+            <a:endParaRPr b="0" lang="en-IN" sz="3200" spc="-1" strike="noStrike">
+              <a:solidFill>
+                <a:srgbClr val="000000"/>
+              </a:solidFill>
+              <a:uFill>
+                <a:solidFill>
+                  <a:srgbClr val="ffffff"/>
+                </a:solidFill>
+              </a:uFill>
+              <a:latin typeface="Arial"/>
+            </a:endParaRPr>
+          </a:p>
+        </p:txBody>
+      </p:sp>
+      <p:sp>
+        <p:nvSpPr>
+          <p:cNvPr id="69" name="PlaceHolder 3"/>
           <p:cNvSpPr>
             <a:spLocks noGrp="1"/>
           </p:cNvSpPr>
@@ -2032,7 +2046,7 @@
         <p:spPr>
           <a:xfrm>
             <a:off x="311760" y="1152360"/>
-            <a:ext cx="8520120" cy="3416040"/>
+            <a:ext cx="8519760" cy="3415680"/>
           </a:xfrm>
           <a:prstGeom prst="rect">
             <a:avLst/>
@@ -2041,7 +2055,7 @@
         <p:txBody>
           <a:bodyPr lIns="0" rIns="0" tIns="0" bIns="0"/>
           <a:p>
-            <a:endParaRPr b="0" lang="en-IN" sz="1400" spc="-1" strike="noStrike">
+            <a:endParaRPr b="0" lang="en-IN" sz="3200" spc="-1" strike="noStrike">
               <a:solidFill>
                 <a:srgbClr val="000000"/>
               </a:solidFill>
@@ -2057,7 +2071,7 @@
       </p:sp>
       <p:pic>
         <p:nvPicPr>
-          <p:cNvPr id="72" name="" descr=""/>
+          <p:cNvPr id="70" name="" descr=""/>
           <p:cNvPicPr/>
           <p:nvPr/>
         </p:nvPicPr>
@@ -2067,8 +2081,8 @@
         </p:blipFill>
         <p:spPr>
           <a:xfrm>
-            <a:off x="2430720" y="1152000"/>
-            <a:ext cx="4281480" cy="3416040"/>
+            <a:off x="2431080" y="1152360"/>
+            <a:ext cx="4280760" cy="3415680"/>
           </a:xfrm>
           <a:prstGeom prst="rect">
             <a:avLst/>
@@ -2080,7 +2094,7 @@
       </p:pic>
       <p:pic>
         <p:nvPicPr>
-          <p:cNvPr id="73" name="" descr=""/>
+          <p:cNvPr id="71" name="" descr=""/>
           <p:cNvPicPr/>
           <p:nvPr/>
         </p:nvPicPr>
@@ -2090,8 +2104,8 @@
         </p:blipFill>
         <p:spPr>
           <a:xfrm>
-            <a:off x="2430720" y="1152000"/>
-            <a:ext cx="4281480" cy="3416040"/>
+            <a:off x="2431080" y="1152360"/>
+            <a:ext cx="4280760" cy="3415680"/>
           </a:xfrm>
           <a:prstGeom prst="rect">
             <a:avLst/>
@@ -2125,7 +2139,7 @@
       </p:grpSpPr>
       <p:sp>
         <p:nvSpPr>
-          <p:cNvPr id="5" name="PlaceHolder 1"/>
+          <p:cNvPr id="4" name="PlaceHolder 1"/>
           <p:cNvSpPr>
             <a:spLocks noGrp="1"/>
           </p:cNvSpPr>
@@ -2135,8 +2149,8 @@
         </p:nvSpPr>
         <p:spPr>
           <a:xfrm>
-            <a:off x="311760" y="444960"/>
-            <a:ext cx="8520120" cy="572400"/>
+            <a:off x="311760" y="418320"/>
+            <a:ext cx="8519760" cy="625320"/>
           </a:xfrm>
           <a:prstGeom prst="rect">
             <a:avLst/>
@@ -2145,23 +2159,24 @@
         <p:txBody>
           <a:bodyPr lIns="0" rIns="0" tIns="0" bIns="0" anchor="ctr"/>
           <a:p>
-            <a:endParaRPr b="0" lang="en-IN" sz="1400" spc="-1" strike="noStrike">
-              <a:solidFill>
-                <a:srgbClr val="000000"/>
-              </a:solidFill>
-              <a:uFill>
-                <a:solidFill>
-                  <a:srgbClr val="ffffff"/>
-                </a:solidFill>
-              </a:uFill>
-              <a:latin typeface="Arial"/>
-            </a:endParaRPr>
-          </a:p>
-        </p:txBody>
-      </p:sp>
-      <p:sp>
-        <p:nvSpPr>
-          <p:cNvPr id="6" name="PlaceHolder 2"/>
+            <a:pPr algn="ctr"/>
+            <a:endParaRPr b="0" lang="en-IN" sz="4400" spc="-1" strike="noStrike">
+              <a:solidFill>
+                <a:srgbClr val="000000"/>
+              </a:solidFill>
+              <a:uFill>
+                <a:solidFill>
+                  <a:srgbClr val="ffffff"/>
+                </a:solidFill>
+              </a:uFill>
+              <a:latin typeface="Arial"/>
+            </a:endParaRPr>
+          </a:p>
+        </p:txBody>
+      </p:sp>
+      <p:sp>
+        <p:nvSpPr>
+          <p:cNvPr id="5" name="PlaceHolder 2"/>
           <p:cNvSpPr>
             <a:spLocks noGrp="1"/>
           </p:cNvSpPr>
@@ -2172,7 +2187,7 @@
         <p:spPr>
           <a:xfrm>
             <a:off x="311760" y="1152360"/>
-            <a:ext cx="8520120" cy="3416040"/>
+            <a:ext cx="8519760" cy="3415680"/>
           </a:xfrm>
           <a:prstGeom prst="rect">
             <a:avLst/>
@@ -2181,7 +2196,7 @@
         <p:txBody>
           <a:bodyPr lIns="0" rIns="0" tIns="0" bIns="0"/>
           <a:p>
-            <a:endParaRPr b="0" lang="en-IN" sz="1400" spc="-1" strike="noStrike">
+            <a:endParaRPr b="0" lang="en-IN" sz="3200" spc="-1" strike="noStrike">
               <a:solidFill>
                 <a:srgbClr val="000000"/>
               </a:solidFill>
@@ -2219,7 +2234,7 @@
       </p:grpSpPr>
       <p:sp>
         <p:nvSpPr>
-          <p:cNvPr id="7" name="PlaceHolder 1"/>
+          <p:cNvPr id="6" name="PlaceHolder 1"/>
           <p:cNvSpPr>
             <a:spLocks noGrp="1"/>
           </p:cNvSpPr>
@@ -2229,8 +2244,8 @@
         </p:nvSpPr>
         <p:spPr>
           <a:xfrm>
-            <a:off x="311760" y="444960"/>
-            <a:ext cx="8520120" cy="572400"/>
+            <a:off x="311760" y="418320"/>
+            <a:ext cx="8519760" cy="625320"/>
           </a:xfrm>
           <a:prstGeom prst="rect">
             <a:avLst/>
@@ -2239,23 +2254,24 @@
         <p:txBody>
           <a:bodyPr lIns="0" rIns="0" tIns="0" bIns="0" anchor="ctr"/>
           <a:p>
-            <a:endParaRPr b="0" lang="en-IN" sz="1400" spc="-1" strike="noStrike">
-              <a:solidFill>
-                <a:srgbClr val="000000"/>
-              </a:solidFill>
-              <a:uFill>
-                <a:solidFill>
-                  <a:srgbClr val="ffffff"/>
-                </a:solidFill>
-              </a:uFill>
-              <a:latin typeface="Arial"/>
-            </a:endParaRPr>
-          </a:p>
-        </p:txBody>
-      </p:sp>
-      <p:sp>
-        <p:nvSpPr>
-          <p:cNvPr id="8" name="PlaceHolder 2"/>
+            <a:pPr algn="ctr"/>
+            <a:endParaRPr b="0" lang="en-IN" sz="4400" spc="-1" strike="noStrike">
+              <a:solidFill>
+                <a:srgbClr val="000000"/>
+              </a:solidFill>
+              <a:uFill>
+                <a:solidFill>
+                  <a:srgbClr val="ffffff"/>
+                </a:solidFill>
+              </a:uFill>
+              <a:latin typeface="Arial"/>
+            </a:endParaRPr>
+          </a:p>
+        </p:txBody>
+      </p:sp>
+      <p:sp>
+        <p:nvSpPr>
+          <p:cNvPr id="7" name="PlaceHolder 2"/>
           <p:cNvSpPr>
             <a:spLocks noGrp="1"/>
           </p:cNvSpPr>
@@ -2266,7 +2282,7 @@
         <p:spPr>
           <a:xfrm>
             <a:off x="311760" y="1152360"/>
-            <a:ext cx="4157640" cy="3416040"/>
+            <a:ext cx="4157280" cy="3415680"/>
           </a:xfrm>
           <a:prstGeom prst="rect">
             <a:avLst/>
@@ -2275,23 +2291,23 @@
         <p:txBody>
           <a:bodyPr lIns="0" rIns="0" tIns="0" bIns="0"/>
           <a:p>
-            <a:endParaRPr b="0" lang="en-IN" sz="1400" spc="-1" strike="noStrike">
-              <a:solidFill>
-                <a:srgbClr val="000000"/>
-              </a:solidFill>
-              <a:uFill>
-                <a:solidFill>
-                  <a:srgbClr val="ffffff"/>
-                </a:solidFill>
-              </a:uFill>
-              <a:latin typeface="Arial"/>
-            </a:endParaRPr>
-          </a:p>
-        </p:txBody>
-      </p:sp>
-      <p:sp>
-        <p:nvSpPr>
-          <p:cNvPr id="9" name="PlaceHolder 3"/>
+            <a:endParaRPr b="0" lang="en-IN" sz="3200" spc="-1" strike="noStrike">
+              <a:solidFill>
+                <a:srgbClr val="000000"/>
+              </a:solidFill>
+              <a:uFill>
+                <a:solidFill>
+                  <a:srgbClr val="ffffff"/>
+                </a:solidFill>
+              </a:uFill>
+              <a:latin typeface="Arial"/>
+            </a:endParaRPr>
+          </a:p>
+        </p:txBody>
+      </p:sp>
+      <p:sp>
+        <p:nvSpPr>
+          <p:cNvPr id="8" name="PlaceHolder 3"/>
           <p:cNvSpPr>
             <a:spLocks noGrp="1"/>
           </p:cNvSpPr>
@@ -2301,8 +2317,8 @@
         </p:nvSpPr>
         <p:spPr>
           <a:xfrm>
-            <a:off x="4677840" y="1152360"/>
-            <a:ext cx="4157640" cy="3416040"/>
+            <a:off x="4677120" y="1152360"/>
+            <a:ext cx="4157280" cy="3415680"/>
           </a:xfrm>
           <a:prstGeom prst="rect">
             <a:avLst/>
@@ -2311,7 +2327,7 @@
         <p:txBody>
           <a:bodyPr lIns="0" rIns="0" tIns="0" bIns="0"/>
           <a:p>
-            <a:endParaRPr b="0" lang="en-IN" sz="1400" spc="-1" strike="noStrike">
+            <a:endParaRPr b="0" lang="en-IN" sz="3200" spc="-1" strike="noStrike">
               <a:solidFill>
                 <a:srgbClr val="000000"/>
               </a:solidFill>
@@ -2349,7 +2365,7 @@
       </p:grpSpPr>
       <p:sp>
         <p:nvSpPr>
-          <p:cNvPr id="10" name="PlaceHolder 1"/>
+          <p:cNvPr id="9" name="PlaceHolder 1"/>
           <p:cNvSpPr>
             <a:spLocks noGrp="1"/>
           </p:cNvSpPr>
@@ -2359,8 +2375,8 @@
         </p:nvSpPr>
         <p:spPr>
           <a:xfrm>
-            <a:off x="311760" y="444960"/>
-            <a:ext cx="8520120" cy="572400"/>
+            <a:off x="311760" y="418320"/>
+            <a:ext cx="8519760" cy="625320"/>
           </a:xfrm>
           <a:prstGeom prst="rect">
             <a:avLst/>
@@ -2369,7 +2385,8 @@
         <p:txBody>
           <a:bodyPr lIns="0" rIns="0" tIns="0" bIns="0" anchor="ctr"/>
           <a:p>
-            <a:endParaRPr b="0" lang="en-IN" sz="1400" spc="-1" strike="noStrike">
+            <a:pPr algn="ctr"/>
+            <a:endParaRPr b="0" lang="en-IN" sz="4400" spc="-1" strike="noStrike">
               <a:solidFill>
                 <a:srgbClr val="000000"/>
               </a:solidFill>
@@ -2407,7 +2424,7 @@
       </p:grpSpPr>
       <p:sp>
         <p:nvSpPr>
-          <p:cNvPr id="11" name="PlaceHolder 1"/>
+          <p:cNvPr id="10" name="PlaceHolder 1"/>
           <p:cNvSpPr>
             <a:spLocks noGrp="1"/>
           </p:cNvSpPr>
@@ -2418,7 +2435,7 @@
         <p:spPr>
           <a:xfrm>
             <a:off x="311760" y="444960"/>
-            <a:ext cx="8520120" cy="2654640"/>
+            <a:ext cx="8519760" cy="2652840"/>
           </a:xfrm>
           <a:prstGeom prst="rect">
             <a:avLst/>
@@ -2466,7 +2483,7 @@
       </p:grpSpPr>
       <p:sp>
         <p:nvSpPr>
-          <p:cNvPr id="12" name="PlaceHolder 1"/>
+          <p:cNvPr id="11" name="PlaceHolder 1"/>
           <p:cNvSpPr>
             <a:spLocks noGrp="1"/>
           </p:cNvSpPr>
@@ -2476,8 +2493,8 @@
         </p:nvSpPr>
         <p:spPr>
           <a:xfrm>
-            <a:off x="311760" y="444960"/>
-            <a:ext cx="8520120" cy="572400"/>
+            <a:off x="311760" y="418320"/>
+            <a:ext cx="8519760" cy="625320"/>
           </a:xfrm>
           <a:prstGeom prst="rect">
             <a:avLst/>
@@ -2486,23 +2503,24 @@
         <p:txBody>
           <a:bodyPr lIns="0" rIns="0" tIns="0" bIns="0" anchor="ctr"/>
           <a:p>
-            <a:endParaRPr b="0" lang="en-IN" sz="1400" spc="-1" strike="noStrike">
-              <a:solidFill>
-                <a:srgbClr val="000000"/>
-              </a:solidFill>
-              <a:uFill>
-                <a:solidFill>
-                  <a:srgbClr val="ffffff"/>
-                </a:solidFill>
-              </a:uFill>
-              <a:latin typeface="Arial"/>
-            </a:endParaRPr>
-          </a:p>
-        </p:txBody>
-      </p:sp>
-      <p:sp>
-        <p:nvSpPr>
-          <p:cNvPr id="13" name="PlaceHolder 2"/>
+            <a:pPr algn="ctr"/>
+            <a:endParaRPr b="0" lang="en-IN" sz="4400" spc="-1" strike="noStrike">
+              <a:solidFill>
+                <a:srgbClr val="000000"/>
+              </a:solidFill>
+              <a:uFill>
+                <a:solidFill>
+                  <a:srgbClr val="ffffff"/>
+                </a:solidFill>
+              </a:uFill>
+              <a:latin typeface="Arial"/>
+            </a:endParaRPr>
+          </a:p>
+        </p:txBody>
+      </p:sp>
+      <p:sp>
+        <p:nvSpPr>
+          <p:cNvPr id="12" name="PlaceHolder 2"/>
           <p:cNvSpPr>
             <a:spLocks noGrp="1"/>
           </p:cNvSpPr>
@@ -2513,7 +2531,7 @@
         <p:spPr>
           <a:xfrm>
             <a:off x="311760" y="1152360"/>
-            <a:ext cx="4157640" cy="1629360"/>
+            <a:ext cx="4157280" cy="1629000"/>
           </a:xfrm>
           <a:prstGeom prst="rect">
             <a:avLst/>
@@ -2522,23 +2540,23 @@
         <p:txBody>
           <a:bodyPr lIns="0" rIns="0" tIns="0" bIns="0"/>
           <a:p>
-            <a:endParaRPr b="0" lang="en-IN" sz="1400" spc="-1" strike="noStrike">
-              <a:solidFill>
-                <a:srgbClr val="000000"/>
-              </a:solidFill>
-              <a:uFill>
-                <a:solidFill>
-                  <a:srgbClr val="ffffff"/>
-                </a:solidFill>
-              </a:uFill>
-              <a:latin typeface="Arial"/>
-            </a:endParaRPr>
-          </a:p>
-        </p:txBody>
-      </p:sp>
-      <p:sp>
-        <p:nvSpPr>
-          <p:cNvPr id="14" name="PlaceHolder 3"/>
+            <a:endParaRPr b="0" lang="en-IN" sz="3200" spc="-1" strike="noStrike">
+              <a:solidFill>
+                <a:srgbClr val="000000"/>
+              </a:solidFill>
+              <a:uFill>
+                <a:solidFill>
+                  <a:srgbClr val="ffffff"/>
+                </a:solidFill>
+              </a:uFill>
+              <a:latin typeface="Arial"/>
+            </a:endParaRPr>
+          </a:p>
+        </p:txBody>
+      </p:sp>
+      <p:sp>
+        <p:nvSpPr>
+          <p:cNvPr id="13" name="PlaceHolder 3"/>
           <p:cNvSpPr>
             <a:spLocks noGrp="1"/>
           </p:cNvSpPr>
@@ -2548,8 +2566,8 @@
         </p:nvSpPr>
         <p:spPr>
           <a:xfrm>
-            <a:off x="311760" y="2936880"/>
-            <a:ext cx="4157640" cy="1629360"/>
+            <a:off x="311760" y="2936520"/>
+            <a:ext cx="4157280" cy="1629000"/>
           </a:xfrm>
           <a:prstGeom prst="rect">
             <a:avLst/>
@@ -2558,23 +2576,23 @@
         <p:txBody>
           <a:bodyPr lIns="0" rIns="0" tIns="0" bIns="0"/>
           <a:p>
-            <a:endParaRPr b="0" lang="en-IN" sz="1400" spc="-1" strike="noStrike">
-              <a:solidFill>
-                <a:srgbClr val="000000"/>
-              </a:solidFill>
-              <a:uFill>
-                <a:solidFill>
-                  <a:srgbClr val="ffffff"/>
-                </a:solidFill>
-              </a:uFill>
-              <a:latin typeface="Arial"/>
-            </a:endParaRPr>
-          </a:p>
-        </p:txBody>
-      </p:sp>
-      <p:sp>
-        <p:nvSpPr>
-          <p:cNvPr id="15" name="PlaceHolder 4"/>
+            <a:endParaRPr b="0" lang="en-IN" sz="3200" spc="-1" strike="noStrike">
+              <a:solidFill>
+                <a:srgbClr val="000000"/>
+              </a:solidFill>
+              <a:uFill>
+                <a:solidFill>
+                  <a:srgbClr val="ffffff"/>
+                </a:solidFill>
+              </a:uFill>
+              <a:latin typeface="Arial"/>
+            </a:endParaRPr>
+          </a:p>
+        </p:txBody>
+      </p:sp>
+      <p:sp>
+        <p:nvSpPr>
+          <p:cNvPr id="14" name="PlaceHolder 4"/>
           <p:cNvSpPr>
             <a:spLocks noGrp="1"/>
           </p:cNvSpPr>
@@ -2584,8 +2602,8 @@
         </p:nvSpPr>
         <p:spPr>
           <a:xfrm>
-            <a:off x="4677840" y="1152360"/>
-            <a:ext cx="4157640" cy="3416040"/>
+            <a:off x="4677120" y="1152360"/>
+            <a:ext cx="4157280" cy="3415680"/>
           </a:xfrm>
           <a:prstGeom prst="rect">
             <a:avLst/>
@@ -2594,7 +2612,7 @@
         <p:txBody>
           <a:bodyPr lIns="0" rIns="0" tIns="0" bIns="0"/>
           <a:p>
-            <a:endParaRPr b="0" lang="en-IN" sz="1400" spc="-1" strike="noStrike">
+            <a:endParaRPr b="0" lang="en-IN" sz="3200" spc="-1" strike="noStrike">
               <a:solidFill>
                 <a:srgbClr val="000000"/>
               </a:solidFill>
@@ -2632,7 +2650,7 @@
       </p:grpSpPr>
       <p:sp>
         <p:nvSpPr>
-          <p:cNvPr id="16" name="PlaceHolder 1"/>
+          <p:cNvPr id="15" name="PlaceHolder 1"/>
           <p:cNvSpPr>
             <a:spLocks noGrp="1"/>
           </p:cNvSpPr>
@@ -2642,8 +2660,8 @@
         </p:nvSpPr>
         <p:spPr>
           <a:xfrm>
-            <a:off x="311760" y="444960"/>
-            <a:ext cx="8520120" cy="572400"/>
+            <a:off x="311760" y="418320"/>
+            <a:ext cx="8519760" cy="625320"/>
           </a:xfrm>
           <a:prstGeom prst="rect">
             <a:avLst/>
@@ -2652,23 +2670,24 @@
         <p:txBody>
           <a:bodyPr lIns="0" rIns="0" tIns="0" bIns="0" anchor="ctr"/>
           <a:p>
-            <a:endParaRPr b="0" lang="en-IN" sz="1400" spc="-1" strike="noStrike">
-              <a:solidFill>
-                <a:srgbClr val="000000"/>
-              </a:solidFill>
-              <a:uFill>
-                <a:solidFill>
-                  <a:srgbClr val="ffffff"/>
-                </a:solidFill>
-              </a:uFill>
-              <a:latin typeface="Arial"/>
-            </a:endParaRPr>
-          </a:p>
-        </p:txBody>
-      </p:sp>
-      <p:sp>
-        <p:nvSpPr>
-          <p:cNvPr id="17" name="PlaceHolder 2"/>
+            <a:pPr algn="ctr"/>
+            <a:endParaRPr b="0" lang="en-IN" sz="4400" spc="-1" strike="noStrike">
+              <a:solidFill>
+                <a:srgbClr val="000000"/>
+              </a:solidFill>
+              <a:uFill>
+                <a:solidFill>
+                  <a:srgbClr val="ffffff"/>
+                </a:solidFill>
+              </a:uFill>
+              <a:latin typeface="Arial"/>
+            </a:endParaRPr>
+          </a:p>
+        </p:txBody>
+      </p:sp>
+      <p:sp>
+        <p:nvSpPr>
+          <p:cNvPr id="16" name="PlaceHolder 2"/>
           <p:cNvSpPr>
             <a:spLocks noGrp="1"/>
           </p:cNvSpPr>
@@ -2679,7 +2698,7 @@
         <p:spPr>
           <a:xfrm>
             <a:off x="311760" y="1152360"/>
-            <a:ext cx="4157640" cy="3416040"/>
+            <a:ext cx="4157280" cy="3415680"/>
           </a:xfrm>
           <a:prstGeom prst="rect">
             <a:avLst/>
@@ -2688,23 +2707,23 @@
         <p:txBody>
           <a:bodyPr lIns="0" rIns="0" tIns="0" bIns="0"/>
           <a:p>
-            <a:endParaRPr b="0" lang="en-IN" sz="1400" spc="-1" strike="noStrike">
-              <a:solidFill>
-                <a:srgbClr val="000000"/>
-              </a:solidFill>
-              <a:uFill>
-                <a:solidFill>
-                  <a:srgbClr val="ffffff"/>
-                </a:solidFill>
-              </a:uFill>
-              <a:latin typeface="Arial"/>
-            </a:endParaRPr>
-          </a:p>
-        </p:txBody>
-      </p:sp>
-      <p:sp>
-        <p:nvSpPr>
-          <p:cNvPr id="18" name="PlaceHolder 3"/>
+            <a:endParaRPr b="0" lang="en-IN" sz="3200" spc="-1" strike="noStrike">
+              <a:solidFill>
+                <a:srgbClr val="000000"/>
+              </a:solidFill>
+              <a:uFill>
+                <a:solidFill>
+                  <a:srgbClr val="ffffff"/>
+                </a:solidFill>
+              </a:uFill>
+              <a:latin typeface="Arial"/>
+            </a:endParaRPr>
+          </a:p>
+        </p:txBody>
+      </p:sp>
+      <p:sp>
+        <p:nvSpPr>
+          <p:cNvPr id="17" name="PlaceHolder 3"/>
           <p:cNvSpPr>
             <a:spLocks noGrp="1"/>
           </p:cNvSpPr>
@@ -2714,8 +2733,8 @@
         </p:nvSpPr>
         <p:spPr>
           <a:xfrm>
-            <a:off x="4677840" y="1152360"/>
-            <a:ext cx="4157640" cy="1629360"/>
+            <a:off x="4677120" y="1152360"/>
+            <a:ext cx="4157280" cy="1629000"/>
           </a:xfrm>
           <a:prstGeom prst="rect">
             <a:avLst/>
@@ -2724,23 +2743,23 @@
         <p:txBody>
           <a:bodyPr lIns="0" rIns="0" tIns="0" bIns="0"/>
           <a:p>
-            <a:endParaRPr b="0" lang="en-IN" sz="1400" spc="-1" strike="noStrike">
-              <a:solidFill>
-                <a:srgbClr val="000000"/>
-              </a:solidFill>
-              <a:uFill>
-                <a:solidFill>
-                  <a:srgbClr val="ffffff"/>
-                </a:solidFill>
-              </a:uFill>
-              <a:latin typeface="Arial"/>
-            </a:endParaRPr>
-          </a:p>
-        </p:txBody>
-      </p:sp>
-      <p:sp>
-        <p:nvSpPr>
-          <p:cNvPr id="19" name="PlaceHolder 4"/>
+            <a:endParaRPr b="0" lang="en-IN" sz="3200" spc="-1" strike="noStrike">
+              <a:solidFill>
+                <a:srgbClr val="000000"/>
+              </a:solidFill>
+              <a:uFill>
+                <a:solidFill>
+                  <a:srgbClr val="ffffff"/>
+                </a:solidFill>
+              </a:uFill>
+              <a:latin typeface="Arial"/>
+            </a:endParaRPr>
+          </a:p>
+        </p:txBody>
+      </p:sp>
+      <p:sp>
+        <p:nvSpPr>
+          <p:cNvPr id="18" name="PlaceHolder 4"/>
           <p:cNvSpPr>
             <a:spLocks noGrp="1"/>
           </p:cNvSpPr>
@@ -2750,8 +2769,8 @@
         </p:nvSpPr>
         <p:spPr>
           <a:xfrm>
-            <a:off x="4677840" y="2936880"/>
-            <a:ext cx="4157640" cy="1629360"/>
+            <a:off x="4677120" y="2936520"/>
+            <a:ext cx="4157280" cy="1629000"/>
           </a:xfrm>
           <a:prstGeom prst="rect">
             <a:avLst/>
@@ -2760,7 +2779,7 @@
         <p:txBody>
           <a:bodyPr lIns="0" rIns="0" tIns="0" bIns="0"/>
           <a:p>
-            <a:endParaRPr b="0" lang="en-IN" sz="1400" spc="-1" strike="noStrike">
+            <a:endParaRPr b="0" lang="en-IN" sz="3200" spc="-1" strike="noStrike">
               <a:solidFill>
                 <a:srgbClr val="000000"/>
               </a:solidFill>
@@ -2798,7 +2817,7 @@
       </p:grpSpPr>
       <p:sp>
         <p:nvSpPr>
-          <p:cNvPr id="20" name="PlaceHolder 1"/>
+          <p:cNvPr id="19" name="PlaceHolder 1"/>
           <p:cNvSpPr>
             <a:spLocks noGrp="1"/>
           </p:cNvSpPr>
@@ -2808,8 +2827,8 @@
         </p:nvSpPr>
         <p:spPr>
           <a:xfrm>
-            <a:off x="311760" y="444960"/>
-            <a:ext cx="8520120" cy="572400"/>
+            <a:off x="311760" y="418320"/>
+            <a:ext cx="8519760" cy="625320"/>
           </a:xfrm>
           <a:prstGeom prst="rect">
             <a:avLst/>
@@ -2818,23 +2837,24 @@
         <p:txBody>
           <a:bodyPr lIns="0" rIns="0" tIns="0" bIns="0" anchor="ctr"/>
           <a:p>
-            <a:endParaRPr b="0" lang="en-IN" sz="1400" spc="-1" strike="noStrike">
-              <a:solidFill>
-                <a:srgbClr val="000000"/>
-              </a:solidFill>
-              <a:uFill>
-                <a:solidFill>
-                  <a:srgbClr val="ffffff"/>
-                </a:solidFill>
-              </a:uFill>
-              <a:latin typeface="Arial"/>
-            </a:endParaRPr>
-          </a:p>
-        </p:txBody>
-      </p:sp>
-      <p:sp>
-        <p:nvSpPr>
-          <p:cNvPr id="21" name="PlaceHolder 2"/>
+            <a:pPr algn="ctr"/>
+            <a:endParaRPr b="0" lang="en-IN" sz="4400" spc="-1" strike="noStrike">
+              <a:solidFill>
+                <a:srgbClr val="000000"/>
+              </a:solidFill>
+              <a:uFill>
+                <a:solidFill>
+                  <a:srgbClr val="ffffff"/>
+                </a:solidFill>
+              </a:uFill>
+              <a:latin typeface="Arial"/>
+            </a:endParaRPr>
+          </a:p>
+        </p:txBody>
+      </p:sp>
+      <p:sp>
+        <p:nvSpPr>
+          <p:cNvPr id="20" name="PlaceHolder 2"/>
           <p:cNvSpPr>
             <a:spLocks noGrp="1"/>
           </p:cNvSpPr>
@@ -2845,7 +2865,7 @@
         <p:spPr>
           <a:xfrm>
             <a:off x="311760" y="1152360"/>
-            <a:ext cx="4157640" cy="1629360"/>
+            <a:ext cx="4157280" cy="1629000"/>
           </a:xfrm>
           <a:prstGeom prst="rect">
             <a:avLst/>
@@ -2854,23 +2874,23 @@
         <p:txBody>
           <a:bodyPr lIns="0" rIns="0" tIns="0" bIns="0"/>
           <a:p>
-            <a:endParaRPr b="0" lang="en-IN" sz="1400" spc="-1" strike="noStrike">
-              <a:solidFill>
-                <a:srgbClr val="000000"/>
-              </a:solidFill>
-              <a:uFill>
-                <a:solidFill>
-                  <a:srgbClr val="ffffff"/>
-                </a:solidFill>
-              </a:uFill>
-              <a:latin typeface="Arial"/>
-            </a:endParaRPr>
-          </a:p>
-        </p:txBody>
-      </p:sp>
-      <p:sp>
-        <p:nvSpPr>
-          <p:cNvPr id="22" name="PlaceHolder 3"/>
+            <a:endParaRPr b="0" lang="en-IN" sz="3200" spc="-1" strike="noStrike">
+              <a:solidFill>
+                <a:srgbClr val="000000"/>
+              </a:solidFill>
+              <a:uFill>
+                <a:solidFill>
+                  <a:srgbClr val="ffffff"/>
+                </a:solidFill>
+              </a:uFill>
+              <a:latin typeface="Arial"/>
+            </a:endParaRPr>
+          </a:p>
+        </p:txBody>
+      </p:sp>
+      <p:sp>
+        <p:nvSpPr>
+          <p:cNvPr id="21" name="PlaceHolder 3"/>
           <p:cNvSpPr>
             <a:spLocks noGrp="1"/>
           </p:cNvSpPr>
@@ -2880,8 +2900,8 @@
         </p:nvSpPr>
         <p:spPr>
           <a:xfrm>
-            <a:off x="4677840" y="1152360"/>
-            <a:ext cx="4157640" cy="1629360"/>
+            <a:off x="4677120" y="1152360"/>
+            <a:ext cx="4157280" cy="1629000"/>
           </a:xfrm>
           <a:prstGeom prst="rect">
             <a:avLst/>
@@ -2890,23 +2910,23 @@
         <p:txBody>
           <a:bodyPr lIns="0" rIns="0" tIns="0" bIns="0"/>
           <a:p>
-            <a:endParaRPr b="0" lang="en-IN" sz="1400" spc="-1" strike="noStrike">
-              <a:solidFill>
-                <a:srgbClr val="000000"/>
-              </a:solidFill>
-              <a:uFill>
-                <a:solidFill>
-                  <a:srgbClr val="ffffff"/>
-                </a:solidFill>
-              </a:uFill>
-              <a:latin typeface="Arial"/>
-            </a:endParaRPr>
-          </a:p>
-        </p:txBody>
-      </p:sp>
-      <p:sp>
-        <p:nvSpPr>
-          <p:cNvPr id="23" name="PlaceHolder 4"/>
+            <a:endParaRPr b="0" lang="en-IN" sz="3200" spc="-1" strike="noStrike">
+              <a:solidFill>
+                <a:srgbClr val="000000"/>
+              </a:solidFill>
+              <a:uFill>
+                <a:solidFill>
+                  <a:srgbClr val="ffffff"/>
+                </a:solidFill>
+              </a:uFill>
+              <a:latin typeface="Arial"/>
+            </a:endParaRPr>
+          </a:p>
+        </p:txBody>
+      </p:sp>
+      <p:sp>
+        <p:nvSpPr>
+          <p:cNvPr id="22" name="PlaceHolder 4"/>
           <p:cNvSpPr>
             <a:spLocks noGrp="1"/>
           </p:cNvSpPr>
@@ -2916,8 +2936,8 @@
         </p:nvSpPr>
         <p:spPr>
           <a:xfrm>
-            <a:off x="311760" y="2936880"/>
-            <a:ext cx="8520120" cy="1629360"/>
+            <a:off x="311760" y="2936520"/>
+            <a:ext cx="8519760" cy="1629000"/>
           </a:xfrm>
           <a:prstGeom prst="rect">
             <a:avLst/>
@@ -2926,7 +2946,7 @@
         <p:txBody>
           <a:bodyPr lIns="0" rIns="0" tIns="0" bIns="0"/>
           <a:p>
-            <a:endParaRPr b="0" lang="en-IN" sz="1400" spc="-1" strike="noStrike">
+            <a:endParaRPr b="0" lang="en-IN" sz="3200" spc="-1" strike="noStrike">
               <a:solidFill>
                 <a:srgbClr val="000000"/>
               </a:solidFill>
@@ -2981,17 +3001,18 @@
         </p:nvSpPr>
         <p:spPr>
           <a:xfrm>
-            <a:off x="311760" y="744480"/>
-            <a:ext cx="8520120" cy="2052360"/>
-          </a:xfrm>
-          <a:prstGeom prst="rect">
-            <a:avLst/>
-          </a:prstGeom>
-        </p:spPr>
-        <p:txBody>
-          <a:bodyPr tIns="91440" bIns="91440" anchor="b"/>
-          <a:p>
-            <a:endParaRPr b="0" lang="en-IN" sz="1400" spc="-1" strike="noStrike">
+            <a:off x="311760" y="444960"/>
+            <a:ext cx="8519760" cy="572040"/>
+          </a:xfrm>
+          <a:prstGeom prst="rect">
+            <a:avLst/>
+          </a:prstGeom>
+        </p:spPr>
+        <p:txBody>
+          <a:bodyPr lIns="0" rIns="0" tIns="0" bIns="0" anchor="ctr"/>
+          <a:p>
+            <a:pPr algn="ctr"/>
+            <a:endParaRPr b="0" lang="en-IN" sz="4400" spc="-1" strike="noStrike">
               <a:solidFill>
                 <a:srgbClr val="000000"/>
               </a:solidFill>
@@ -3008,62 +3029,6 @@
       <p:sp>
         <p:nvSpPr>
           <p:cNvPr id="1" name="PlaceHolder 2"/>
-          <p:cNvSpPr>
-            <a:spLocks noGrp="1"/>
-          </p:cNvSpPr>
-          <p:nvPr>
-            <p:ph type="sldNum"/>
-          </p:nvPr>
-        </p:nvSpPr>
-        <p:spPr>
-          <a:xfrm>
-            <a:off x="8472600" y="4663080"/>
-            <a:ext cx="548280" cy="393120"/>
-          </a:xfrm>
-          <a:prstGeom prst="rect">
-            <a:avLst/>
-          </a:prstGeom>
-        </p:spPr>
-        <p:txBody>
-          <a:bodyPr tIns="91440" bIns="91440" anchor="ctr"/>
-          <a:p>
-            <a:pPr algn="r">
-              <a:lnSpc>
-                <a:spcPct val="100000"/>
-              </a:lnSpc>
-            </a:pPr>
-            <a:fld id="{D662FA96-E900-46A5-A3F1-06CDCB2A19D4}" type="slidenum">
-              <a:rPr b="0" lang="en-IN" sz="1000" spc="-1" strike="noStrike">
-                <a:solidFill>
-                  <a:srgbClr val="595959"/>
-                </a:solidFill>
-                <a:uFill>
-                  <a:solidFill>
-                    <a:srgbClr val="ffffff"/>
-                  </a:solidFill>
-                </a:uFill>
-                <a:latin typeface="Arial"/>
-                <a:ea typeface="Arial"/>
-              </a:rPr>
-              <a:t>&lt;number&gt;</a:t>
-            </a:fld>
-            <a:endParaRPr b="0" lang="en-IN" sz="1400" spc="-1" strike="noStrike">
-              <a:solidFill>
-                <a:srgbClr val="000000"/>
-              </a:solidFill>
-              <a:uFill>
-                <a:solidFill>
-                  <a:srgbClr val="ffffff"/>
-                </a:solidFill>
-              </a:uFill>
-              <a:latin typeface="Times New Roman"/>
-            </a:endParaRPr>
-          </a:p>
-        </p:txBody>
-      </p:sp>
-      <p:sp>
-        <p:nvSpPr>
-          <p:cNvPr id="2" name="PlaceHolder 3"/>
           <p:cNvSpPr>
             <a:spLocks noGrp="1"/>
           </p:cNvSpPr>
@@ -3092,7 +3057,7 @@
               <a:buChar char=""/>
             </a:pPr>
             <a:r>
-              <a:rPr b="0" lang="en-IN" sz="1400" spc="-1" strike="noStrike">
+              <a:rPr b="0" lang="en-IN" sz="3200" spc="-1" strike="noStrike">
                 <a:solidFill>
                   <a:srgbClr val="000000"/>
                 </a:solidFill>
@@ -3105,7 +3070,7 @@
               </a:rPr>
               <a:t>Click to edit the outline text format</a:t>
             </a:r>
-            <a:endParaRPr b="0" lang="en-IN" sz="1400" spc="-1" strike="noStrike">
+            <a:endParaRPr b="0" lang="en-IN" sz="3200" spc="-1" strike="noStrike">
               <a:solidFill>
                 <a:srgbClr val="000000"/>
               </a:solidFill>
@@ -3127,7 +3092,7 @@
               <a:buChar char=""/>
             </a:pPr>
             <a:r>
-              <a:rPr b="0" lang="en-IN" sz="1400" spc="-1" strike="noStrike">
+              <a:rPr b="0" lang="en-IN" sz="2800" spc="-1" strike="noStrike">
                 <a:solidFill>
                   <a:srgbClr val="000000"/>
                 </a:solidFill>
@@ -3140,7 +3105,7 @@
               </a:rPr>
               <a:t>Second Outline Level</a:t>
             </a:r>
-            <a:endParaRPr b="0" lang="en-IN" sz="1400" spc="-1" strike="noStrike">
+            <a:endParaRPr b="0" lang="en-IN" sz="2800" spc="-1" strike="noStrike">
               <a:solidFill>
                 <a:srgbClr val="000000"/>
               </a:solidFill>
@@ -3162,7 +3127,7 @@
               <a:buChar char=""/>
             </a:pPr>
             <a:r>
-              <a:rPr b="0" lang="en-IN" sz="1400" spc="-1" strike="noStrike">
+              <a:rPr b="0" lang="en-IN" sz="2400" spc="-1" strike="noStrike">
                 <a:solidFill>
                   <a:srgbClr val="000000"/>
                 </a:solidFill>
@@ -3175,7 +3140,7 @@
               </a:rPr>
               <a:t>Third Outline Level</a:t>
             </a:r>
-            <a:endParaRPr b="0" lang="en-IN" sz="1400" spc="-1" strike="noStrike">
+            <a:endParaRPr b="0" lang="en-IN" sz="2400" spc="-1" strike="noStrike">
               <a:solidFill>
                 <a:srgbClr val="000000"/>
               </a:solidFill>
@@ -3197,7 +3162,7 @@
               <a:buChar char=""/>
             </a:pPr>
             <a:r>
-              <a:rPr b="0" lang="en-IN" sz="1400" spc="-1" strike="noStrike">
+              <a:rPr b="0" lang="en-IN" sz="2000" spc="-1" strike="noStrike">
                 <a:solidFill>
                   <a:srgbClr val="000000"/>
                 </a:solidFill>
@@ -3210,7 +3175,7 @@
               </a:rPr>
               <a:t>Fourth Outline Level</a:t>
             </a:r>
-            <a:endParaRPr b="0" lang="en-IN" sz="1400" spc="-1" strike="noStrike">
+            <a:endParaRPr b="0" lang="en-IN" sz="2000" spc="-1" strike="noStrike">
               <a:solidFill>
                 <a:srgbClr val="000000"/>
               </a:solidFill>
@@ -3375,7 +3340,7 @@
       </p:grpSpPr>
       <p:sp>
         <p:nvSpPr>
-          <p:cNvPr id="37" name="PlaceHolder 1"/>
+          <p:cNvPr id="36" name="PlaceHolder 1"/>
           <p:cNvSpPr>
             <a:spLocks noGrp="1"/>
           </p:cNvSpPr>
@@ -3386,32 +3351,33 @@
         <p:spPr>
           <a:xfrm>
             <a:off x="311760" y="444960"/>
-            <a:ext cx="8520120" cy="572400"/>
-          </a:xfrm>
-          <a:prstGeom prst="rect">
-            <a:avLst/>
-          </a:prstGeom>
-        </p:spPr>
-        <p:txBody>
-          <a:bodyPr tIns="91440" bIns="91440"/>
-          <a:p>
-            <a:endParaRPr b="0" lang="en-IN" sz="1400" spc="-1" strike="noStrike">
-              <a:solidFill>
-                <a:srgbClr val="000000"/>
-              </a:solidFill>
-              <a:uFill>
-                <a:solidFill>
-                  <a:srgbClr val="ffffff"/>
-                </a:solidFill>
-              </a:uFill>
-              <a:latin typeface="Arial"/>
-            </a:endParaRPr>
-          </a:p>
-        </p:txBody>
-      </p:sp>
-      <p:sp>
-        <p:nvSpPr>
-          <p:cNvPr id="38" name="PlaceHolder 2"/>
+            <a:ext cx="8519760" cy="572040"/>
+          </a:xfrm>
+          <a:prstGeom prst="rect">
+            <a:avLst/>
+          </a:prstGeom>
+        </p:spPr>
+        <p:txBody>
+          <a:bodyPr lIns="0" rIns="0" tIns="0" bIns="0" anchor="ctr"/>
+          <a:p>
+            <a:pPr algn="ctr"/>
+            <a:endParaRPr b="0" lang="en-IN" sz="4400" spc="-1" strike="noStrike">
+              <a:solidFill>
+                <a:srgbClr val="000000"/>
+              </a:solidFill>
+              <a:uFill>
+                <a:solidFill>
+                  <a:srgbClr val="ffffff"/>
+                </a:solidFill>
+              </a:uFill>
+              <a:latin typeface="Arial"/>
+            </a:endParaRPr>
+          </a:p>
+        </p:txBody>
+      </p:sp>
+      <p:sp>
+        <p:nvSpPr>
+          <p:cNvPr id="37" name="PlaceHolder 2"/>
           <p:cNvSpPr>
             <a:spLocks noGrp="1"/>
           </p:cNvSpPr>
@@ -3422,14 +3388,14 @@
         <p:spPr>
           <a:xfrm>
             <a:off x="311760" y="1152360"/>
-            <a:ext cx="8520120" cy="3416040"/>
-          </a:xfrm>
-          <a:prstGeom prst="rect">
-            <a:avLst/>
-          </a:prstGeom>
-        </p:spPr>
-        <p:txBody>
-          <a:bodyPr tIns="91440" bIns="91440"/>
+            <a:ext cx="8519760" cy="3415680"/>
+          </a:xfrm>
+          <a:prstGeom prst="rect">
+            <a:avLst/>
+          </a:prstGeom>
+        </p:spPr>
+        <p:txBody>
+          <a:bodyPr lIns="0" rIns="0" tIns="0" bIns="0"/>
           <a:p>
             <a:pPr marL="432000" indent="-324000">
               <a:buClr>
@@ -3673,62 +3639,6 @@
                 </a:solidFill>
               </a:uFill>
               <a:latin typeface="Arial"/>
-            </a:endParaRPr>
-          </a:p>
-        </p:txBody>
-      </p:sp>
-      <p:sp>
-        <p:nvSpPr>
-          <p:cNvPr id="39" name="PlaceHolder 3"/>
-          <p:cNvSpPr>
-            <a:spLocks noGrp="1"/>
-          </p:cNvSpPr>
-          <p:nvPr>
-            <p:ph type="sldNum"/>
-          </p:nvPr>
-        </p:nvSpPr>
-        <p:spPr>
-          <a:xfrm>
-            <a:off x="8472600" y="4663080"/>
-            <a:ext cx="548280" cy="393120"/>
-          </a:xfrm>
-          <a:prstGeom prst="rect">
-            <a:avLst/>
-          </a:prstGeom>
-        </p:spPr>
-        <p:txBody>
-          <a:bodyPr tIns="91440" bIns="91440" anchor="ctr"/>
-          <a:p>
-            <a:pPr algn="r">
-              <a:lnSpc>
-                <a:spcPct val="100000"/>
-              </a:lnSpc>
-            </a:pPr>
-            <a:fld id="{A76C7E51-2BBA-4E7B-96A9-9CF258D38FB2}" type="slidenum">
-              <a:rPr b="0" lang="en-IN" sz="1000" spc="-1" strike="noStrike">
-                <a:solidFill>
-                  <a:srgbClr val="595959"/>
-                </a:solidFill>
-                <a:uFill>
-                  <a:solidFill>
-                    <a:srgbClr val="ffffff"/>
-                  </a:solidFill>
-                </a:uFill>
-                <a:latin typeface="Arial"/>
-                <a:ea typeface="Arial"/>
-              </a:rPr>
-              <a:t>1</a:t>
-            </a:fld>
-            <a:endParaRPr b="0" lang="en-IN" sz="1400" spc="-1" strike="noStrike">
-              <a:solidFill>
-                <a:srgbClr val="000000"/>
-              </a:solidFill>
-              <a:uFill>
-                <a:solidFill>
-                  <a:srgbClr val="ffffff"/>
-                </a:solidFill>
-              </a:uFill>
-              <a:latin typeface="Times New Roman"/>
             </a:endParaRPr>
           </a:p>
         </p:txBody>
@@ -3772,14 +3682,14 @@
       </p:grpSpPr>
       <p:sp>
         <p:nvSpPr>
-          <p:cNvPr id="74" name="TextShape 1"/>
-          <p:cNvSpPr txBox="1"/>
+          <p:cNvPr id="72" name="CustomShape 1"/>
+          <p:cNvSpPr/>
           <p:nvPr/>
         </p:nvSpPr>
         <p:spPr>
           <a:xfrm>
             <a:off x="311760" y="744480"/>
-            <a:ext cx="8520120" cy="2052360"/>
+            <a:ext cx="8519760" cy="2052000"/>
           </a:xfrm>
           <a:prstGeom prst="rect">
             <a:avLst/>
@@ -3789,8 +3699,14 @@
             <a:noFill/>
           </a:ln>
         </p:spPr>
-        <p:txBody>
-          <a:bodyPr tIns="91440" bIns="91440" anchor="b"/>
+        <p:style>
+          <a:lnRef idx="0"/>
+          <a:fillRef idx="0"/>
+          <a:effectRef idx="0"/>
+          <a:fontRef idx="minor"/>
+        </p:style>
+        <p:txBody>
+          <a:bodyPr lIns="90000" rIns="90000" tIns="91440" bIns="91440" anchor="b"/>
           <a:p>
             <a:pPr algn="ctr">
               <a:lnSpc>
@@ -3812,7 +3728,7 @@
               </a:rPr>
               <a:t>MECM call flows</a:t>
             </a:r>
-            <a:endParaRPr b="0" lang="en-IN" sz="1400" spc="-1" strike="noStrike">
+            <a:endParaRPr b="0" lang="en-IN" sz="1800" spc="-1" strike="noStrike">
               <a:solidFill>
                 <a:srgbClr val="000000"/>
               </a:solidFill>
@@ -3877,14 +3793,14 @@
       </p:grpSpPr>
       <p:sp>
         <p:nvSpPr>
-          <p:cNvPr id="75" name="TextShape 1"/>
-          <p:cNvSpPr txBox="1"/>
+          <p:cNvPr id="73" name="CustomShape 1"/>
+          <p:cNvSpPr/>
           <p:nvPr/>
         </p:nvSpPr>
         <p:spPr>
           <a:xfrm>
             <a:off x="311760" y="0"/>
-            <a:ext cx="8520120" cy="572400"/>
+            <a:ext cx="8519760" cy="572040"/>
           </a:xfrm>
           <a:prstGeom prst="rect">
             <a:avLst/>
@@ -3894,8 +3810,14 @@
             <a:noFill/>
           </a:ln>
         </p:spPr>
-        <p:txBody>
-          <a:bodyPr tIns="91440" bIns="91440"/>
+        <p:style>
+          <a:lnRef idx="0"/>
+          <a:fillRef idx="0"/>
+          <a:effectRef idx="0"/>
+          <a:fontRef idx="minor"/>
+        </p:style>
+        <p:txBody>
+          <a:bodyPr lIns="90000" rIns="90000" tIns="91440" bIns="91440"/>
           <a:p>
             <a:pPr>
               <a:lnSpc>
@@ -3917,7 +3839,7 @@
               </a:rPr>
               <a:t>Create application instance</a:t>
             </a:r>
-            <a:endParaRPr b="0" lang="en-IN" sz="1400" spc="-1" strike="noStrike">
+            <a:endParaRPr b="0" lang="en-IN" sz="1800" spc="-1" strike="noStrike">
               <a:solidFill>
                 <a:srgbClr val="000000"/>
               </a:solidFill>
@@ -3933,7 +3855,7 @@
       </p:sp>
       <p:pic>
         <p:nvPicPr>
-          <p:cNvPr id="76" name="Google Shape;61;p14" descr=""/>
+          <p:cNvPr id="74" name="Google Shape;61;p14" descr=""/>
           <p:cNvPicPr/>
           <p:nvPr/>
         </p:nvPicPr>
@@ -3944,7 +3866,7 @@
         <p:spPr>
           <a:xfrm>
             <a:off x="1450800" y="572760"/>
-            <a:ext cx="5703480" cy="4570560"/>
+            <a:ext cx="5703120" cy="4570200"/>
           </a:xfrm>
           <a:prstGeom prst="rect">
             <a:avLst/>
@@ -4005,14 +3927,14 @@
       </p:grpSpPr>
       <p:sp>
         <p:nvSpPr>
-          <p:cNvPr id="77" name="TextShape 1"/>
-          <p:cNvSpPr txBox="1"/>
+          <p:cNvPr id="75" name="CustomShape 1"/>
+          <p:cNvSpPr/>
           <p:nvPr/>
         </p:nvSpPr>
         <p:spPr>
           <a:xfrm>
             <a:off x="311760" y="0"/>
-            <a:ext cx="8520120" cy="572400"/>
+            <a:ext cx="8519760" cy="572040"/>
           </a:xfrm>
           <a:prstGeom prst="rect">
             <a:avLst/>
@@ -4022,8 +3944,14 @@
             <a:noFill/>
           </a:ln>
         </p:spPr>
-        <p:txBody>
-          <a:bodyPr tIns="91440" bIns="91440"/>
+        <p:style>
+          <a:lnRef idx="0"/>
+          <a:fillRef idx="0"/>
+          <a:effectRef idx="0"/>
+          <a:fontRef idx="minor"/>
+        </p:style>
+        <p:txBody>
+          <a:bodyPr lIns="90000" rIns="90000" tIns="91440" bIns="91440"/>
           <a:p>
             <a:pPr>
               <a:lnSpc>
@@ -4045,7 +3973,7 @@
               </a:rPr>
               <a:t>Instantiate application instance</a:t>
             </a:r>
-            <a:endParaRPr b="0" lang="en-IN" sz="1400" spc="-1" strike="noStrike">
+            <a:endParaRPr b="0" lang="en-IN" sz="1800" spc="-1" strike="noStrike">
               <a:solidFill>
                 <a:srgbClr val="000000"/>
               </a:solidFill>
@@ -4061,7 +3989,7 @@
       </p:sp>
       <p:pic>
         <p:nvPicPr>
-          <p:cNvPr id="78" name="Google Shape;67;p15" descr=""/>
+          <p:cNvPr id="76" name="Google Shape;67;p15" descr=""/>
           <p:cNvPicPr/>
           <p:nvPr/>
         </p:nvPicPr>
@@ -4072,7 +4000,7 @@
         <p:spPr>
           <a:xfrm>
             <a:off x="403200" y="572760"/>
-            <a:ext cx="7072920" cy="4570560"/>
+            <a:ext cx="7072560" cy="4570200"/>
           </a:xfrm>
           <a:prstGeom prst="rect">
             <a:avLst/>
@@ -4133,14 +4061,14 @@
       </p:grpSpPr>
       <p:sp>
         <p:nvSpPr>
-          <p:cNvPr id="79" name="TextShape 1"/>
-          <p:cNvSpPr txBox="1"/>
+          <p:cNvPr id="77" name="CustomShape 1"/>
+          <p:cNvSpPr/>
           <p:nvPr/>
         </p:nvSpPr>
         <p:spPr>
           <a:xfrm>
             <a:off x="311760" y="0"/>
-            <a:ext cx="8520120" cy="572400"/>
+            <a:ext cx="8519760" cy="572040"/>
           </a:xfrm>
           <a:prstGeom prst="rect">
             <a:avLst/>
@@ -4150,8 +4078,14 @@
             <a:noFill/>
           </a:ln>
         </p:spPr>
-        <p:txBody>
-          <a:bodyPr tIns="91440" bIns="91440"/>
+        <p:style>
+          <a:lnRef idx="0"/>
+          <a:fillRef idx="0"/>
+          <a:effectRef idx="0"/>
+          <a:fontRef idx="minor"/>
+        </p:style>
+        <p:txBody>
+          <a:bodyPr lIns="90000" rIns="90000" tIns="91440" bIns="91440"/>
           <a:p>
             <a:pPr>
               <a:lnSpc>
@@ -4173,7 +4107,7 @@
               </a:rPr>
               <a:t>Terminate application instance</a:t>
             </a:r>
-            <a:endParaRPr b="0" lang="en-IN" sz="1400" spc="-1" strike="noStrike">
+            <a:endParaRPr b="0" lang="en-IN" sz="1800" spc="-1" strike="noStrike">
               <a:solidFill>
                 <a:srgbClr val="000000"/>
               </a:solidFill>
@@ -4189,7 +4123,7 @@
       </p:sp>
       <p:pic>
         <p:nvPicPr>
-          <p:cNvPr id="80" name="" descr=""/>
+          <p:cNvPr id="78" name="" descr=""/>
           <p:cNvPicPr/>
           <p:nvPr/>
         </p:nvPicPr>
@@ -4199,8 +4133,8 @@
         </p:blipFill>
         <p:spPr>
           <a:xfrm>
-            <a:off x="462240" y="581760"/>
-            <a:ext cx="7924320" cy="4409640"/>
+            <a:off x="491400" y="720000"/>
+            <a:ext cx="6276600" cy="4247640"/>
           </a:xfrm>
           <a:prstGeom prst="rect">
             <a:avLst/>
@@ -4261,14 +4195,14 @@
       </p:grpSpPr>
       <p:sp>
         <p:nvSpPr>
-          <p:cNvPr id="81" name="TextShape 1"/>
-          <p:cNvSpPr txBox="1"/>
+          <p:cNvPr id="79" name="CustomShape 1"/>
+          <p:cNvSpPr/>
           <p:nvPr/>
         </p:nvSpPr>
         <p:spPr>
           <a:xfrm>
             <a:off x="311760" y="1152360"/>
-            <a:ext cx="8520120" cy="3416040"/>
+            <a:ext cx="8519760" cy="3415680"/>
           </a:xfrm>
           <a:prstGeom prst="rect">
             <a:avLst/>
@@ -4278,15 +4212,21 @@
             <a:noFill/>
           </a:ln>
         </p:spPr>
-        <p:txBody>
-          <a:bodyPr tIns="91440" bIns="91440"/>
+        <p:style>
+          <a:lnRef idx="0"/>
+          <a:fillRef idx="0"/>
+          <a:effectRef idx="0"/>
+          <a:fontRef idx="minor"/>
+        </p:style>
+        <p:txBody>
+          <a:bodyPr lIns="90000" rIns="90000" tIns="91440" bIns="91440"/>
           <a:p>
             <a:pPr>
               <a:lnSpc>
                 <a:spcPct val="100000"/>
               </a:lnSpc>
             </a:pPr>
-            <a:endParaRPr b="0" lang="en-IN" sz="1400" spc="-1" strike="noStrike">
+            <a:endParaRPr b="0" lang="en-IN" sz="1800" spc="-1" strike="noStrike">
               <a:solidFill>
                 <a:srgbClr val="000000"/>
               </a:solidFill>
@@ -4304,7 +4244,7 @@
                 <a:spcPct val="100000"/>
               </a:lnSpc>
             </a:pPr>
-            <a:endParaRPr b="0" lang="en-IN" sz="1400" spc="-1" strike="noStrike">
+            <a:endParaRPr b="0" lang="en-IN" sz="1800" spc="-1" strike="noStrike">
               <a:solidFill>
                 <a:srgbClr val="000000"/>
               </a:solidFill>
@@ -4322,7 +4262,7 @@
                 <a:spcPct val="100000"/>
               </a:lnSpc>
             </a:pPr>
-            <a:endParaRPr b="0" lang="en-IN" sz="1400" spc="-1" strike="noStrike">
+            <a:endParaRPr b="0" lang="en-IN" sz="1800" spc="-1" strike="noStrike">
               <a:solidFill>
                 <a:srgbClr val="000000"/>
               </a:solidFill>
@@ -4370,7 +4310,7 @@
               </a:rPr>
               <a:t>Thank you</a:t>
             </a:r>
-            <a:endParaRPr b="0" lang="en-IN" sz="1400" spc="-1" strike="noStrike">
+            <a:endParaRPr b="0" lang="en-IN" sz="1800" spc="-1" strike="noStrike">
               <a:solidFill>
                 <a:srgbClr val="000000"/>
               </a:solidFill>

</xml_diff>

<commit_message>
mecm call flows update
</commit_message>
<xml_diff>
--- a/MECM PT/Release V1.1/MECM-Call-Flows.pptx
+++ b/MECM PT/Release V1.1/MECM-Call-Flows.pptx
@@ -68,8 +68,8 @@
         </p:nvSpPr>
         <p:spPr>
           <a:xfrm>
-            <a:off x="311760" y="418320"/>
-            <a:ext cx="8519760" cy="625320"/>
+            <a:off x="457200" y="205200"/>
+            <a:ext cx="8229240" cy="858600"/>
           </a:xfrm>
           <a:prstGeom prst="rect">
             <a:avLst/>
@@ -105,8 +105,8 @@
         </p:nvSpPr>
         <p:spPr>
           <a:xfrm>
-            <a:off x="311760" y="1152360"/>
-            <a:ext cx="8519760" cy="1629000"/>
+            <a:off x="457200" y="1203480"/>
+            <a:ext cx="8229240" cy="1422720"/>
           </a:xfrm>
           <a:prstGeom prst="rect">
             <a:avLst/>
@@ -141,8 +141,8 @@
         </p:nvSpPr>
         <p:spPr>
           <a:xfrm>
-            <a:off x="311760" y="2936520"/>
-            <a:ext cx="8519760" cy="1629000"/>
+            <a:off x="457200" y="2761920"/>
+            <a:ext cx="8229240" cy="1422720"/>
           </a:xfrm>
           <a:prstGeom prst="rect">
             <a:avLst/>
@@ -199,8 +199,8 @@
         </p:nvSpPr>
         <p:spPr>
           <a:xfrm>
-            <a:off x="311760" y="418320"/>
-            <a:ext cx="8519760" cy="625320"/>
+            <a:off x="457200" y="205200"/>
+            <a:ext cx="8229240" cy="858600"/>
           </a:xfrm>
           <a:prstGeom prst="rect">
             <a:avLst/>
@@ -236,8 +236,8 @@
         </p:nvSpPr>
         <p:spPr>
           <a:xfrm>
-            <a:off x="311760" y="1152360"/>
-            <a:ext cx="4157280" cy="1629000"/>
+            <a:off x="457200" y="1203480"/>
+            <a:ext cx="4015800" cy="1422720"/>
           </a:xfrm>
           <a:prstGeom prst="rect">
             <a:avLst/>
@@ -272,8 +272,8 @@
         </p:nvSpPr>
         <p:spPr>
           <a:xfrm>
-            <a:off x="4677120" y="1152360"/>
-            <a:ext cx="4157280" cy="1629000"/>
+            <a:off x="4674240" y="1203480"/>
+            <a:ext cx="4015800" cy="1422720"/>
           </a:xfrm>
           <a:prstGeom prst="rect">
             <a:avLst/>
@@ -308,8 +308,8 @@
         </p:nvSpPr>
         <p:spPr>
           <a:xfrm>
-            <a:off x="4677120" y="2936520"/>
-            <a:ext cx="4157280" cy="1629000"/>
+            <a:off x="4674240" y="2761920"/>
+            <a:ext cx="4015800" cy="1422720"/>
           </a:xfrm>
           <a:prstGeom prst="rect">
             <a:avLst/>
@@ -344,8 +344,8 @@
         </p:nvSpPr>
         <p:spPr>
           <a:xfrm>
-            <a:off x="311760" y="2936520"/>
-            <a:ext cx="4157280" cy="1629000"/>
+            <a:off x="457200" y="2761920"/>
+            <a:ext cx="4015800" cy="1422720"/>
           </a:xfrm>
           <a:prstGeom prst="rect">
             <a:avLst/>
@@ -402,8 +402,8 @@
         </p:nvSpPr>
         <p:spPr>
           <a:xfrm>
-            <a:off x="311760" y="418320"/>
-            <a:ext cx="8519760" cy="625320"/>
+            <a:off x="457200" y="205200"/>
+            <a:ext cx="8229240" cy="858600"/>
           </a:xfrm>
           <a:prstGeom prst="rect">
             <a:avLst/>
@@ -439,8 +439,8 @@
         </p:nvSpPr>
         <p:spPr>
           <a:xfrm>
-            <a:off x="311760" y="1152360"/>
-            <a:ext cx="8519760" cy="3415680"/>
+            <a:off x="457200" y="1203480"/>
+            <a:ext cx="8229240" cy="2982960"/>
           </a:xfrm>
           <a:prstGeom prst="rect">
             <a:avLst/>
@@ -475,8 +475,8 @@
         </p:nvSpPr>
         <p:spPr>
           <a:xfrm>
-            <a:off x="311760" y="1152360"/>
-            <a:ext cx="8519760" cy="3415680"/>
+            <a:off x="457200" y="1203480"/>
+            <a:ext cx="8229240" cy="2982960"/>
           </a:xfrm>
           <a:prstGeom prst="rect">
             <a:avLst/>
@@ -511,8 +511,8 @@
         </p:blipFill>
         <p:spPr>
           <a:xfrm>
-            <a:off x="2431080" y="1152360"/>
-            <a:ext cx="4280760" cy="3415680"/>
+            <a:off x="2702160" y="1203480"/>
+            <a:ext cx="3738600" cy="2982960"/>
           </a:xfrm>
           <a:prstGeom prst="rect">
             <a:avLst/>
@@ -534,8 +534,8 @@
         </p:blipFill>
         <p:spPr>
           <a:xfrm>
-            <a:off x="2431080" y="1152360"/>
-            <a:ext cx="4280760" cy="3415680"/>
+            <a:off x="2702160" y="1203480"/>
+            <a:ext cx="3738600" cy="2982960"/>
           </a:xfrm>
           <a:prstGeom prst="rect">
             <a:avLst/>
@@ -601,8 +601,8 @@
         </p:nvSpPr>
         <p:spPr>
           <a:xfrm>
-            <a:off x="311760" y="418320"/>
-            <a:ext cx="8519760" cy="625320"/>
+            <a:off x="457200" y="205200"/>
+            <a:ext cx="8229240" cy="858600"/>
           </a:xfrm>
           <a:prstGeom prst="rect">
             <a:avLst/>
@@ -638,8 +638,8 @@
         </p:nvSpPr>
         <p:spPr>
           <a:xfrm>
-            <a:off x="311760" y="1152360"/>
-            <a:ext cx="8519760" cy="3415680"/>
+            <a:off x="457200" y="1203480"/>
+            <a:ext cx="8229240" cy="2982960"/>
           </a:xfrm>
           <a:prstGeom prst="rect">
             <a:avLst/>
@@ -697,8 +697,8 @@
         </p:nvSpPr>
         <p:spPr>
           <a:xfrm>
-            <a:off x="311760" y="418320"/>
-            <a:ext cx="8519760" cy="625320"/>
+            <a:off x="457200" y="205200"/>
+            <a:ext cx="8229240" cy="858600"/>
           </a:xfrm>
           <a:prstGeom prst="rect">
             <a:avLst/>
@@ -734,8 +734,8 @@
         </p:nvSpPr>
         <p:spPr>
           <a:xfrm>
-            <a:off x="311760" y="1152360"/>
-            <a:ext cx="8519760" cy="3415680"/>
+            <a:off x="457200" y="1203480"/>
+            <a:ext cx="8229240" cy="2982960"/>
           </a:xfrm>
           <a:prstGeom prst="rect">
             <a:avLst/>
@@ -792,8 +792,8 @@
         </p:nvSpPr>
         <p:spPr>
           <a:xfrm>
-            <a:off x="311760" y="418320"/>
-            <a:ext cx="8519760" cy="625320"/>
+            <a:off x="457200" y="205200"/>
+            <a:ext cx="8229240" cy="858600"/>
           </a:xfrm>
           <a:prstGeom prst="rect">
             <a:avLst/>
@@ -829,8 +829,8 @@
         </p:nvSpPr>
         <p:spPr>
           <a:xfrm>
-            <a:off x="311760" y="1152360"/>
-            <a:ext cx="4157280" cy="3415680"/>
+            <a:off x="457200" y="1203480"/>
+            <a:ext cx="4015800" cy="2982960"/>
           </a:xfrm>
           <a:prstGeom prst="rect">
             <a:avLst/>
@@ -865,8 +865,8 @@
         </p:nvSpPr>
         <p:spPr>
           <a:xfrm>
-            <a:off x="4677120" y="1152360"/>
-            <a:ext cx="4157280" cy="3415680"/>
+            <a:off x="4674240" y="1203480"/>
+            <a:ext cx="4015800" cy="2982960"/>
           </a:xfrm>
           <a:prstGeom prst="rect">
             <a:avLst/>
@@ -923,8 +923,8 @@
         </p:nvSpPr>
         <p:spPr>
           <a:xfrm>
-            <a:off x="311760" y="418320"/>
-            <a:ext cx="8519760" cy="625320"/>
+            <a:off x="457200" y="205200"/>
+            <a:ext cx="8229240" cy="858600"/>
           </a:xfrm>
           <a:prstGeom prst="rect">
             <a:avLst/>
@@ -982,8 +982,8 @@
         </p:nvSpPr>
         <p:spPr>
           <a:xfrm>
-            <a:off x="311760" y="444960"/>
-            <a:ext cx="8519760" cy="2652840"/>
+            <a:off x="457200" y="205200"/>
+            <a:ext cx="8229240" cy="3981240"/>
           </a:xfrm>
           <a:prstGeom prst="rect">
             <a:avLst/>
@@ -1041,8 +1041,8 @@
         </p:nvSpPr>
         <p:spPr>
           <a:xfrm>
-            <a:off x="311760" y="418320"/>
-            <a:ext cx="8519760" cy="625320"/>
+            <a:off x="457200" y="205200"/>
+            <a:ext cx="8229240" cy="858600"/>
           </a:xfrm>
           <a:prstGeom prst="rect">
             <a:avLst/>
@@ -1078,8 +1078,8 @@
         </p:nvSpPr>
         <p:spPr>
           <a:xfrm>
-            <a:off x="311760" y="1152360"/>
-            <a:ext cx="4157280" cy="1629000"/>
+            <a:off x="457200" y="1203480"/>
+            <a:ext cx="4015800" cy="1422720"/>
           </a:xfrm>
           <a:prstGeom prst="rect">
             <a:avLst/>
@@ -1114,8 +1114,8 @@
         </p:nvSpPr>
         <p:spPr>
           <a:xfrm>
-            <a:off x="311760" y="2936520"/>
-            <a:ext cx="4157280" cy="1629000"/>
+            <a:off x="457200" y="2761920"/>
+            <a:ext cx="4015800" cy="1422720"/>
           </a:xfrm>
           <a:prstGeom prst="rect">
             <a:avLst/>
@@ -1150,8 +1150,8 @@
         </p:nvSpPr>
         <p:spPr>
           <a:xfrm>
-            <a:off x="4677120" y="1152360"/>
-            <a:ext cx="4157280" cy="3415680"/>
+            <a:off x="4674240" y="1203480"/>
+            <a:ext cx="4015800" cy="2982960"/>
           </a:xfrm>
           <a:prstGeom prst="rect">
             <a:avLst/>
@@ -1208,8 +1208,8 @@
         </p:nvSpPr>
         <p:spPr>
           <a:xfrm>
-            <a:off x="311760" y="418320"/>
-            <a:ext cx="8519760" cy="625320"/>
+            <a:off x="457200" y="205200"/>
+            <a:ext cx="8229240" cy="858600"/>
           </a:xfrm>
           <a:prstGeom prst="rect">
             <a:avLst/>
@@ -1245,8 +1245,8 @@
         </p:nvSpPr>
         <p:spPr>
           <a:xfrm>
-            <a:off x="311760" y="1152360"/>
-            <a:ext cx="8519760" cy="3415680"/>
+            <a:off x="457200" y="1203480"/>
+            <a:ext cx="8229240" cy="2982960"/>
           </a:xfrm>
           <a:prstGeom prst="rect">
             <a:avLst/>
@@ -1304,8 +1304,8 @@
         </p:nvSpPr>
         <p:spPr>
           <a:xfrm>
-            <a:off x="311760" y="418320"/>
-            <a:ext cx="8519760" cy="625320"/>
+            <a:off x="457200" y="205200"/>
+            <a:ext cx="8229240" cy="858600"/>
           </a:xfrm>
           <a:prstGeom prst="rect">
             <a:avLst/>
@@ -1341,8 +1341,8 @@
         </p:nvSpPr>
         <p:spPr>
           <a:xfrm>
-            <a:off x="311760" y="1152360"/>
-            <a:ext cx="4157280" cy="3415680"/>
+            <a:off x="457200" y="1203480"/>
+            <a:ext cx="4015800" cy="2982960"/>
           </a:xfrm>
           <a:prstGeom prst="rect">
             <a:avLst/>
@@ -1377,8 +1377,8 @@
         </p:nvSpPr>
         <p:spPr>
           <a:xfrm>
-            <a:off x="4677120" y="1152360"/>
-            <a:ext cx="4157280" cy="1629000"/>
+            <a:off x="4674240" y="1203480"/>
+            <a:ext cx="4015800" cy="1422720"/>
           </a:xfrm>
           <a:prstGeom prst="rect">
             <a:avLst/>
@@ -1413,8 +1413,8 @@
         </p:nvSpPr>
         <p:spPr>
           <a:xfrm>
-            <a:off x="4677120" y="2936520"/>
-            <a:ext cx="4157280" cy="1629000"/>
+            <a:off x="4674240" y="2761920"/>
+            <a:ext cx="4015800" cy="1422720"/>
           </a:xfrm>
           <a:prstGeom prst="rect">
             <a:avLst/>
@@ -1471,8 +1471,8 @@
         </p:nvSpPr>
         <p:spPr>
           <a:xfrm>
-            <a:off x="311760" y="418320"/>
-            <a:ext cx="8519760" cy="625320"/>
+            <a:off x="457200" y="205200"/>
+            <a:ext cx="8229240" cy="858600"/>
           </a:xfrm>
           <a:prstGeom prst="rect">
             <a:avLst/>
@@ -1508,8 +1508,8 @@
         </p:nvSpPr>
         <p:spPr>
           <a:xfrm>
-            <a:off x="311760" y="1152360"/>
-            <a:ext cx="4157280" cy="1629000"/>
+            <a:off x="457200" y="1203480"/>
+            <a:ext cx="4015800" cy="1422720"/>
           </a:xfrm>
           <a:prstGeom prst="rect">
             <a:avLst/>
@@ -1544,8 +1544,8 @@
         </p:nvSpPr>
         <p:spPr>
           <a:xfrm>
-            <a:off x="4677120" y="1152360"/>
-            <a:ext cx="4157280" cy="1629000"/>
+            <a:off x="4674240" y="1203480"/>
+            <a:ext cx="4015800" cy="1422720"/>
           </a:xfrm>
           <a:prstGeom prst="rect">
             <a:avLst/>
@@ -1580,8 +1580,8 @@
         </p:nvSpPr>
         <p:spPr>
           <a:xfrm>
-            <a:off x="311760" y="2936520"/>
-            <a:ext cx="8519760" cy="1629000"/>
+            <a:off x="457200" y="2761920"/>
+            <a:ext cx="8229240" cy="1422720"/>
           </a:xfrm>
           <a:prstGeom prst="rect">
             <a:avLst/>
@@ -1638,8 +1638,8 @@
         </p:nvSpPr>
         <p:spPr>
           <a:xfrm>
-            <a:off x="311760" y="418320"/>
-            <a:ext cx="8519760" cy="625320"/>
+            <a:off x="457200" y="205200"/>
+            <a:ext cx="8229240" cy="858600"/>
           </a:xfrm>
           <a:prstGeom prst="rect">
             <a:avLst/>
@@ -1675,8 +1675,8 @@
         </p:nvSpPr>
         <p:spPr>
           <a:xfrm>
-            <a:off x="311760" y="1152360"/>
-            <a:ext cx="8519760" cy="1629000"/>
+            <a:off x="457200" y="1203480"/>
+            <a:ext cx="8229240" cy="1422720"/>
           </a:xfrm>
           <a:prstGeom prst="rect">
             <a:avLst/>
@@ -1711,8 +1711,8 @@
         </p:nvSpPr>
         <p:spPr>
           <a:xfrm>
-            <a:off x="311760" y="2936520"/>
-            <a:ext cx="8519760" cy="1629000"/>
+            <a:off x="457200" y="2761920"/>
+            <a:ext cx="8229240" cy="1422720"/>
           </a:xfrm>
           <a:prstGeom prst="rect">
             <a:avLst/>
@@ -1769,8 +1769,8 @@
         </p:nvSpPr>
         <p:spPr>
           <a:xfrm>
-            <a:off x="311760" y="418320"/>
-            <a:ext cx="8519760" cy="625320"/>
+            <a:off x="457200" y="205200"/>
+            <a:ext cx="8229240" cy="858600"/>
           </a:xfrm>
           <a:prstGeom prst="rect">
             <a:avLst/>
@@ -1806,8 +1806,8 @@
         </p:nvSpPr>
         <p:spPr>
           <a:xfrm>
-            <a:off x="311760" y="1152360"/>
-            <a:ext cx="4157280" cy="1629000"/>
+            <a:off x="457200" y="1203480"/>
+            <a:ext cx="4015800" cy="1422720"/>
           </a:xfrm>
           <a:prstGeom prst="rect">
             <a:avLst/>
@@ -1842,8 +1842,8 @@
         </p:nvSpPr>
         <p:spPr>
           <a:xfrm>
-            <a:off x="4677120" y="1152360"/>
-            <a:ext cx="4157280" cy="1629000"/>
+            <a:off x="4674240" y="1203480"/>
+            <a:ext cx="4015800" cy="1422720"/>
           </a:xfrm>
           <a:prstGeom prst="rect">
             <a:avLst/>
@@ -1878,8 +1878,8 @@
         </p:nvSpPr>
         <p:spPr>
           <a:xfrm>
-            <a:off x="4677120" y="2936520"/>
-            <a:ext cx="4157280" cy="1629000"/>
+            <a:off x="4674240" y="2761920"/>
+            <a:ext cx="4015800" cy="1422720"/>
           </a:xfrm>
           <a:prstGeom prst="rect">
             <a:avLst/>
@@ -1914,8 +1914,8 @@
         </p:nvSpPr>
         <p:spPr>
           <a:xfrm>
-            <a:off x="311760" y="2936520"/>
-            <a:ext cx="4157280" cy="1629000"/>
+            <a:off x="457200" y="2761920"/>
+            <a:ext cx="4015800" cy="1422720"/>
           </a:xfrm>
           <a:prstGeom prst="rect">
             <a:avLst/>
@@ -1972,8 +1972,8 @@
         </p:nvSpPr>
         <p:spPr>
           <a:xfrm>
-            <a:off x="311760" y="418320"/>
-            <a:ext cx="8519760" cy="625320"/>
+            <a:off x="457200" y="205200"/>
+            <a:ext cx="8229240" cy="858600"/>
           </a:xfrm>
           <a:prstGeom prst="rect">
             <a:avLst/>
@@ -2009,8 +2009,8 @@
         </p:nvSpPr>
         <p:spPr>
           <a:xfrm>
-            <a:off x="311760" y="1152360"/>
-            <a:ext cx="8519760" cy="3415680"/>
+            <a:off x="457200" y="1203480"/>
+            <a:ext cx="8229240" cy="2982960"/>
           </a:xfrm>
           <a:prstGeom prst="rect">
             <a:avLst/>
@@ -2045,8 +2045,8 @@
         </p:nvSpPr>
         <p:spPr>
           <a:xfrm>
-            <a:off x="311760" y="1152360"/>
-            <a:ext cx="8519760" cy="3415680"/>
+            <a:off x="457200" y="1203480"/>
+            <a:ext cx="8229240" cy="2982960"/>
           </a:xfrm>
           <a:prstGeom prst="rect">
             <a:avLst/>
@@ -2081,8 +2081,8 @@
         </p:blipFill>
         <p:spPr>
           <a:xfrm>
-            <a:off x="2431080" y="1152360"/>
-            <a:ext cx="4280760" cy="3415680"/>
+            <a:off x="2702160" y="1203480"/>
+            <a:ext cx="3738600" cy="2982960"/>
           </a:xfrm>
           <a:prstGeom prst="rect">
             <a:avLst/>
@@ -2104,8 +2104,8 @@
         </p:blipFill>
         <p:spPr>
           <a:xfrm>
-            <a:off x="2431080" y="1152360"/>
-            <a:ext cx="4280760" cy="3415680"/>
+            <a:off x="2702160" y="1203480"/>
+            <a:ext cx="3738600" cy="2982960"/>
           </a:xfrm>
           <a:prstGeom prst="rect">
             <a:avLst/>
@@ -2149,8 +2149,8 @@
         </p:nvSpPr>
         <p:spPr>
           <a:xfrm>
-            <a:off x="311760" y="418320"/>
-            <a:ext cx="8519760" cy="625320"/>
+            <a:off x="457200" y="205200"/>
+            <a:ext cx="8229240" cy="858600"/>
           </a:xfrm>
           <a:prstGeom prst="rect">
             <a:avLst/>
@@ -2186,8 +2186,8 @@
         </p:nvSpPr>
         <p:spPr>
           <a:xfrm>
-            <a:off x="311760" y="1152360"/>
-            <a:ext cx="8519760" cy="3415680"/>
+            <a:off x="457200" y="1203480"/>
+            <a:ext cx="8229240" cy="2982960"/>
           </a:xfrm>
           <a:prstGeom prst="rect">
             <a:avLst/>
@@ -2244,8 +2244,8 @@
         </p:nvSpPr>
         <p:spPr>
           <a:xfrm>
-            <a:off x="311760" y="418320"/>
-            <a:ext cx="8519760" cy="625320"/>
+            <a:off x="457200" y="205200"/>
+            <a:ext cx="8229240" cy="858600"/>
           </a:xfrm>
           <a:prstGeom prst="rect">
             <a:avLst/>
@@ -2281,8 +2281,8 @@
         </p:nvSpPr>
         <p:spPr>
           <a:xfrm>
-            <a:off x="311760" y="1152360"/>
-            <a:ext cx="4157280" cy="3415680"/>
+            <a:off x="457200" y="1203480"/>
+            <a:ext cx="4015800" cy="2982960"/>
           </a:xfrm>
           <a:prstGeom prst="rect">
             <a:avLst/>
@@ -2317,8 +2317,8 @@
         </p:nvSpPr>
         <p:spPr>
           <a:xfrm>
-            <a:off x="4677120" y="1152360"/>
-            <a:ext cx="4157280" cy="3415680"/>
+            <a:off x="4674240" y="1203480"/>
+            <a:ext cx="4015800" cy="2982960"/>
           </a:xfrm>
           <a:prstGeom prst="rect">
             <a:avLst/>
@@ -2375,8 +2375,8 @@
         </p:nvSpPr>
         <p:spPr>
           <a:xfrm>
-            <a:off x="311760" y="418320"/>
-            <a:ext cx="8519760" cy="625320"/>
+            <a:off x="457200" y="205200"/>
+            <a:ext cx="8229240" cy="858600"/>
           </a:xfrm>
           <a:prstGeom prst="rect">
             <a:avLst/>
@@ -2434,8 +2434,8 @@
         </p:nvSpPr>
         <p:spPr>
           <a:xfrm>
-            <a:off x="311760" y="444960"/>
-            <a:ext cx="8519760" cy="2652840"/>
+            <a:off x="457200" y="205200"/>
+            <a:ext cx="8229240" cy="3981240"/>
           </a:xfrm>
           <a:prstGeom prst="rect">
             <a:avLst/>
@@ -2493,8 +2493,8 @@
         </p:nvSpPr>
         <p:spPr>
           <a:xfrm>
-            <a:off x="311760" y="418320"/>
-            <a:ext cx="8519760" cy="625320"/>
+            <a:off x="457200" y="205200"/>
+            <a:ext cx="8229240" cy="858600"/>
           </a:xfrm>
           <a:prstGeom prst="rect">
             <a:avLst/>
@@ -2530,8 +2530,8 @@
         </p:nvSpPr>
         <p:spPr>
           <a:xfrm>
-            <a:off x="311760" y="1152360"/>
-            <a:ext cx="4157280" cy="1629000"/>
+            <a:off x="457200" y="1203480"/>
+            <a:ext cx="4015800" cy="1422720"/>
           </a:xfrm>
           <a:prstGeom prst="rect">
             <a:avLst/>
@@ -2566,8 +2566,8 @@
         </p:nvSpPr>
         <p:spPr>
           <a:xfrm>
-            <a:off x="311760" y="2936520"/>
-            <a:ext cx="4157280" cy="1629000"/>
+            <a:off x="457200" y="2761920"/>
+            <a:ext cx="4015800" cy="1422720"/>
           </a:xfrm>
           <a:prstGeom prst="rect">
             <a:avLst/>
@@ -2602,8 +2602,8 @@
         </p:nvSpPr>
         <p:spPr>
           <a:xfrm>
-            <a:off x="4677120" y="1152360"/>
-            <a:ext cx="4157280" cy="3415680"/>
+            <a:off x="4674240" y="1203480"/>
+            <a:ext cx="4015800" cy="2982960"/>
           </a:xfrm>
           <a:prstGeom prst="rect">
             <a:avLst/>
@@ -2660,8 +2660,8 @@
         </p:nvSpPr>
         <p:spPr>
           <a:xfrm>
-            <a:off x="311760" y="418320"/>
-            <a:ext cx="8519760" cy="625320"/>
+            <a:off x="457200" y="205200"/>
+            <a:ext cx="8229240" cy="858600"/>
           </a:xfrm>
           <a:prstGeom prst="rect">
             <a:avLst/>
@@ -2697,8 +2697,8 @@
         </p:nvSpPr>
         <p:spPr>
           <a:xfrm>
-            <a:off x="311760" y="1152360"/>
-            <a:ext cx="4157280" cy="3415680"/>
+            <a:off x="457200" y="1203480"/>
+            <a:ext cx="4015800" cy="2982960"/>
           </a:xfrm>
           <a:prstGeom prst="rect">
             <a:avLst/>
@@ -2733,8 +2733,8 @@
         </p:nvSpPr>
         <p:spPr>
           <a:xfrm>
-            <a:off x="4677120" y="1152360"/>
-            <a:ext cx="4157280" cy="1629000"/>
+            <a:off x="4674240" y="1203480"/>
+            <a:ext cx="4015800" cy="1422720"/>
           </a:xfrm>
           <a:prstGeom prst="rect">
             <a:avLst/>
@@ -2769,8 +2769,8 @@
         </p:nvSpPr>
         <p:spPr>
           <a:xfrm>
-            <a:off x="4677120" y="2936520"/>
-            <a:ext cx="4157280" cy="1629000"/>
+            <a:off x="4674240" y="2761920"/>
+            <a:ext cx="4015800" cy="1422720"/>
           </a:xfrm>
           <a:prstGeom prst="rect">
             <a:avLst/>
@@ -2827,8 +2827,8 @@
         </p:nvSpPr>
         <p:spPr>
           <a:xfrm>
-            <a:off x="311760" y="418320"/>
-            <a:ext cx="8519760" cy="625320"/>
+            <a:off x="457200" y="205200"/>
+            <a:ext cx="8229240" cy="858600"/>
           </a:xfrm>
           <a:prstGeom prst="rect">
             <a:avLst/>
@@ -2864,8 +2864,8 @@
         </p:nvSpPr>
         <p:spPr>
           <a:xfrm>
-            <a:off x="311760" y="1152360"/>
-            <a:ext cx="4157280" cy="1629000"/>
+            <a:off x="457200" y="1203480"/>
+            <a:ext cx="4015800" cy="1422720"/>
           </a:xfrm>
           <a:prstGeom prst="rect">
             <a:avLst/>
@@ -2900,8 +2900,8 @@
         </p:nvSpPr>
         <p:spPr>
           <a:xfrm>
-            <a:off x="4677120" y="1152360"/>
-            <a:ext cx="4157280" cy="1629000"/>
+            <a:off x="4674240" y="1203480"/>
+            <a:ext cx="4015800" cy="1422720"/>
           </a:xfrm>
           <a:prstGeom prst="rect">
             <a:avLst/>
@@ -2936,8 +2936,8 @@
         </p:nvSpPr>
         <p:spPr>
           <a:xfrm>
-            <a:off x="311760" y="2936520"/>
-            <a:ext cx="8519760" cy="1629000"/>
+            <a:off x="457200" y="2761920"/>
+            <a:ext cx="8229240" cy="1422720"/>
           </a:xfrm>
           <a:prstGeom prst="rect">
             <a:avLst/>
@@ -3001,8 +3001,8 @@
         </p:nvSpPr>
         <p:spPr>
           <a:xfrm>
-            <a:off x="311760" y="444960"/>
-            <a:ext cx="8519760" cy="572040"/>
+            <a:off x="311760" y="418320"/>
+            <a:ext cx="8519400" cy="624960"/>
           </a:xfrm>
           <a:prstGeom prst="rect">
             <a:avLst/>
@@ -3038,8 +3038,8 @@
         </p:nvSpPr>
         <p:spPr>
           <a:xfrm>
-            <a:off x="457200" y="1203480"/>
-            <a:ext cx="8229240" cy="2982960"/>
+            <a:off x="311760" y="1152360"/>
+            <a:ext cx="8519400" cy="3415320"/>
           </a:xfrm>
           <a:prstGeom prst="rect">
             <a:avLst/>
@@ -3057,7 +3057,7 @@
               <a:buChar char=""/>
             </a:pPr>
             <a:r>
-              <a:rPr b="0" lang="en-IN" sz="3200" spc="-1" strike="noStrike">
+              <a:rPr b="0" lang="en-IN" sz="1800" spc="-1" strike="noStrike">
                 <a:solidFill>
                   <a:srgbClr val="000000"/>
                 </a:solidFill>
@@ -3070,7 +3070,7 @@
               </a:rPr>
               <a:t>Click to edit the outline text format</a:t>
             </a:r>
-            <a:endParaRPr b="0" lang="en-IN" sz="3200" spc="-1" strike="noStrike">
+            <a:endParaRPr b="0" lang="en-IN" sz="1800" spc="-1" strike="noStrike">
               <a:solidFill>
                 <a:srgbClr val="000000"/>
               </a:solidFill>
@@ -3092,7 +3092,7 @@
               <a:buChar char=""/>
             </a:pPr>
             <a:r>
-              <a:rPr b="0" lang="en-IN" sz="2800" spc="-1" strike="noStrike">
+              <a:rPr b="0" lang="en-IN" sz="1800" spc="-1" strike="noStrike">
                 <a:solidFill>
                   <a:srgbClr val="000000"/>
                 </a:solidFill>
@@ -3105,7 +3105,7 @@
               </a:rPr>
               <a:t>Second Outline Level</a:t>
             </a:r>
-            <a:endParaRPr b="0" lang="en-IN" sz="2800" spc="-1" strike="noStrike">
+            <a:endParaRPr b="0" lang="en-IN" sz="1800" spc="-1" strike="noStrike">
               <a:solidFill>
                 <a:srgbClr val="000000"/>
               </a:solidFill>
@@ -3127,7 +3127,7 @@
               <a:buChar char=""/>
             </a:pPr>
             <a:r>
-              <a:rPr b="0" lang="en-IN" sz="2400" spc="-1" strike="noStrike">
+              <a:rPr b="0" lang="en-IN" sz="1800" spc="-1" strike="noStrike">
                 <a:solidFill>
                   <a:srgbClr val="000000"/>
                 </a:solidFill>
@@ -3140,7 +3140,7 @@
               </a:rPr>
               <a:t>Third Outline Level</a:t>
             </a:r>
-            <a:endParaRPr b="0" lang="en-IN" sz="2400" spc="-1" strike="noStrike">
+            <a:endParaRPr b="0" lang="en-IN" sz="1800" spc="-1" strike="noStrike">
               <a:solidFill>
                 <a:srgbClr val="000000"/>
               </a:solidFill>
@@ -3162,7 +3162,7 @@
               <a:buChar char=""/>
             </a:pPr>
             <a:r>
-              <a:rPr b="0" lang="en-IN" sz="2000" spc="-1" strike="noStrike">
+              <a:rPr b="0" lang="en-IN" sz="1800" spc="-1" strike="noStrike">
                 <a:solidFill>
                   <a:srgbClr val="000000"/>
                 </a:solidFill>
@@ -3175,7 +3175,7 @@
               </a:rPr>
               <a:t>Fourth Outline Level</a:t>
             </a:r>
-            <a:endParaRPr b="0" lang="en-IN" sz="2000" spc="-1" strike="noStrike">
+            <a:endParaRPr b="0" lang="en-IN" sz="1800" spc="-1" strike="noStrike">
               <a:solidFill>
                 <a:srgbClr val="000000"/>
               </a:solidFill>
@@ -3197,7 +3197,7 @@
               <a:buChar char=""/>
             </a:pPr>
             <a:r>
-              <a:rPr b="0" lang="en-IN" sz="2000" spc="-1" strike="noStrike">
+              <a:rPr b="0" lang="en-IN" sz="1800" spc="-1" strike="noStrike">
                 <a:solidFill>
                   <a:srgbClr val="000000"/>
                 </a:solidFill>
@@ -3210,7 +3210,7 @@
               </a:rPr>
               <a:t>Fifth Outline Level</a:t>
             </a:r>
-            <a:endParaRPr b="0" lang="en-IN" sz="2000" spc="-1" strike="noStrike">
+            <a:endParaRPr b="0" lang="en-IN" sz="1800" spc="-1" strike="noStrike">
               <a:solidFill>
                 <a:srgbClr val="000000"/>
               </a:solidFill>
@@ -3232,7 +3232,7 @@
               <a:buChar char=""/>
             </a:pPr>
             <a:r>
-              <a:rPr b="0" lang="en-IN" sz="2000" spc="-1" strike="noStrike">
+              <a:rPr b="0" lang="en-IN" sz="1800" spc="-1" strike="noStrike">
                 <a:solidFill>
                   <a:srgbClr val="000000"/>
                 </a:solidFill>
@@ -3245,7 +3245,7 @@
               </a:rPr>
               <a:t>Sixth Outline Level</a:t>
             </a:r>
-            <a:endParaRPr b="0" lang="en-IN" sz="2000" spc="-1" strike="noStrike">
+            <a:endParaRPr b="0" lang="en-IN" sz="1800" spc="-1" strike="noStrike">
               <a:solidFill>
                 <a:srgbClr val="000000"/>
               </a:solidFill>
@@ -3267,7 +3267,7 @@
               <a:buChar char=""/>
             </a:pPr>
             <a:r>
-              <a:rPr b="0" lang="en-IN" sz="2000" spc="-1" strike="noStrike">
+              <a:rPr b="0" lang="en-IN" sz="1800" spc="-1" strike="noStrike">
                 <a:solidFill>
                   <a:srgbClr val="000000"/>
                 </a:solidFill>
@@ -3280,7 +3280,7 @@
               </a:rPr>
               <a:t>Seventh Outline Level</a:t>
             </a:r>
-            <a:endParaRPr b="0" lang="en-IN" sz="2000" spc="-1" strike="noStrike">
+            <a:endParaRPr b="0" lang="en-IN" sz="1800" spc="-1" strike="noStrike">
               <a:solidFill>
                 <a:srgbClr val="000000"/>
               </a:solidFill>
@@ -3350,8 +3350,8 @@
         </p:nvSpPr>
         <p:spPr>
           <a:xfrm>
-            <a:off x="311760" y="444960"/>
-            <a:ext cx="8519760" cy="572040"/>
+            <a:off x="457200" y="205200"/>
+            <a:ext cx="8229240" cy="858600"/>
           </a:xfrm>
           <a:prstGeom prst="rect">
             <a:avLst/>
@@ -3361,6 +3361,20 @@
           <a:bodyPr lIns="0" rIns="0" tIns="0" bIns="0" anchor="ctr"/>
           <a:p>
             <a:pPr algn="ctr"/>
+            <a:r>
+              <a:rPr b="0" lang="en-IN" sz="4400" spc="-1" strike="noStrike">
+                <a:solidFill>
+                  <a:srgbClr val="000000"/>
+                </a:solidFill>
+                <a:uFill>
+                  <a:solidFill>
+                    <a:srgbClr val="ffffff"/>
+                  </a:solidFill>
+                </a:uFill>
+                <a:latin typeface="Arial"/>
+              </a:rPr>
+              <a:t>Click to edit the title text format</a:t>
+            </a:r>
             <a:endParaRPr b="0" lang="en-IN" sz="4400" spc="-1" strike="noStrike">
               <a:solidFill>
                 <a:srgbClr val="000000"/>
@@ -3387,8 +3401,8 @@
         </p:nvSpPr>
         <p:spPr>
           <a:xfrm>
-            <a:off x="311760" y="1152360"/>
-            <a:ext cx="8519760" cy="3415680"/>
+            <a:off x="457200" y="1203480"/>
+            <a:ext cx="8229240" cy="2982960"/>
           </a:xfrm>
           <a:prstGeom prst="rect">
             <a:avLst/>
@@ -3406,7 +3420,7 @@
               <a:buChar char=""/>
             </a:pPr>
             <a:r>
-              <a:rPr b="0" lang="en-IN" sz="1800" spc="-1" strike="noStrike">
+              <a:rPr b="0" lang="en-IN" sz="3200" spc="-1" strike="noStrike">
                 <a:solidFill>
                   <a:srgbClr val="000000"/>
                 </a:solidFill>
@@ -3419,7 +3433,7 @@
               </a:rPr>
               <a:t>Click to edit the outline text format</a:t>
             </a:r>
-            <a:endParaRPr b="0" lang="en-IN" sz="1800" spc="-1" strike="noStrike">
+            <a:endParaRPr b="0" lang="en-IN" sz="3200" spc="-1" strike="noStrike">
               <a:solidFill>
                 <a:srgbClr val="000000"/>
               </a:solidFill>
@@ -3441,7 +3455,7 @@
               <a:buChar char=""/>
             </a:pPr>
             <a:r>
-              <a:rPr b="0" lang="en-IN" sz="1800" spc="-1" strike="noStrike">
+              <a:rPr b="0" lang="en-IN" sz="2800" spc="-1" strike="noStrike">
                 <a:solidFill>
                   <a:srgbClr val="000000"/>
                 </a:solidFill>
@@ -3454,7 +3468,7 @@
               </a:rPr>
               <a:t>Second Outline Level</a:t>
             </a:r>
-            <a:endParaRPr b="0" lang="en-IN" sz="1800" spc="-1" strike="noStrike">
+            <a:endParaRPr b="0" lang="en-IN" sz="2800" spc="-1" strike="noStrike">
               <a:solidFill>
                 <a:srgbClr val="000000"/>
               </a:solidFill>
@@ -3476,7 +3490,7 @@
               <a:buChar char=""/>
             </a:pPr>
             <a:r>
-              <a:rPr b="0" lang="en-IN" sz="1800" spc="-1" strike="noStrike">
+              <a:rPr b="0" lang="en-IN" sz="2400" spc="-1" strike="noStrike">
                 <a:solidFill>
                   <a:srgbClr val="000000"/>
                 </a:solidFill>
@@ -3489,7 +3503,7 @@
               </a:rPr>
               <a:t>Third Outline Level</a:t>
             </a:r>
-            <a:endParaRPr b="0" lang="en-IN" sz="1800" spc="-1" strike="noStrike">
+            <a:endParaRPr b="0" lang="en-IN" sz="2400" spc="-1" strike="noStrike">
               <a:solidFill>
                 <a:srgbClr val="000000"/>
               </a:solidFill>
@@ -3511,7 +3525,7 @@
               <a:buChar char=""/>
             </a:pPr>
             <a:r>
-              <a:rPr b="0" lang="en-IN" sz="1800" spc="-1" strike="noStrike">
+              <a:rPr b="0" lang="en-IN" sz="2000" spc="-1" strike="noStrike">
                 <a:solidFill>
                   <a:srgbClr val="000000"/>
                 </a:solidFill>
@@ -3524,7 +3538,7 @@
               </a:rPr>
               <a:t>Fourth Outline Level</a:t>
             </a:r>
-            <a:endParaRPr b="0" lang="en-IN" sz="1800" spc="-1" strike="noStrike">
+            <a:endParaRPr b="0" lang="en-IN" sz="2000" spc="-1" strike="noStrike">
               <a:solidFill>
                 <a:srgbClr val="000000"/>
               </a:solidFill>
@@ -3546,7 +3560,7 @@
               <a:buChar char=""/>
             </a:pPr>
             <a:r>
-              <a:rPr b="0" lang="en-IN" sz="1800" spc="-1" strike="noStrike">
+              <a:rPr b="0" lang="en-IN" sz="2000" spc="-1" strike="noStrike">
                 <a:solidFill>
                   <a:srgbClr val="000000"/>
                 </a:solidFill>
@@ -3559,7 +3573,7 @@
               </a:rPr>
               <a:t>Fifth Outline Level</a:t>
             </a:r>
-            <a:endParaRPr b="0" lang="en-IN" sz="1800" spc="-1" strike="noStrike">
+            <a:endParaRPr b="0" lang="en-IN" sz="2000" spc="-1" strike="noStrike">
               <a:solidFill>
                 <a:srgbClr val="000000"/>
               </a:solidFill>
@@ -3581,7 +3595,7 @@
               <a:buChar char=""/>
             </a:pPr>
             <a:r>
-              <a:rPr b="0" lang="en-IN" sz="1800" spc="-1" strike="noStrike">
+              <a:rPr b="0" lang="en-IN" sz="2000" spc="-1" strike="noStrike">
                 <a:solidFill>
                   <a:srgbClr val="000000"/>
                 </a:solidFill>
@@ -3594,7 +3608,7 @@
               </a:rPr>
               <a:t>Sixth Outline Level</a:t>
             </a:r>
-            <a:endParaRPr b="0" lang="en-IN" sz="1800" spc="-1" strike="noStrike">
+            <a:endParaRPr b="0" lang="en-IN" sz="2000" spc="-1" strike="noStrike">
               <a:solidFill>
                 <a:srgbClr val="000000"/>
               </a:solidFill>
@@ -3616,7 +3630,7 @@
               <a:buChar char=""/>
             </a:pPr>
             <a:r>
-              <a:rPr b="0" lang="en-IN" sz="1800" spc="-1" strike="noStrike">
+              <a:rPr b="0" lang="en-IN" sz="2000" spc="-1" strike="noStrike">
                 <a:solidFill>
                   <a:srgbClr val="000000"/>
                 </a:solidFill>
@@ -3629,7 +3643,7 @@
               </a:rPr>
               <a:t>Seventh Outline Level</a:t>
             </a:r>
-            <a:endParaRPr b="0" lang="en-IN" sz="1800" spc="-1" strike="noStrike">
+            <a:endParaRPr b="0" lang="en-IN" sz="2000" spc="-1" strike="noStrike">
               <a:solidFill>
                 <a:srgbClr val="000000"/>
               </a:solidFill>
@@ -3689,7 +3703,7 @@
         <p:spPr>
           <a:xfrm>
             <a:off x="311760" y="744480"/>
-            <a:ext cx="8519760" cy="2052000"/>
+            <a:ext cx="8519400" cy="2051640"/>
           </a:xfrm>
           <a:prstGeom prst="rect">
             <a:avLst/>
@@ -3800,7 +3814,7 @@
         <p:spPr>
           <a:xfrm>
             <a:off x="311760" y="0"/>
-            <a:ext cx="8519760" cy="572040"/>
+            <a:ext cx="8519400" cy="571680"/>
           </a:xfrm>
           <a:prstGeom prst="rect">
             <a:avLst/>
@@ -3866,7 +3880,7 @@
         <p:spPr>
           <a:xfrm>
             <a:off x="1450800" y="572760"/>
-            <a:ext cx="5703120" cy="4570200"/>
+            <a:ext cx="5702760" cy="4569840"/>
           </a:xfrm>
           <a:prstGeom prst="rect">
             <a:avLst/>
@@ -3934,7 +3948,7 @@
         <p:spPr>
           <a:xfrm>
             <a:off x="311760" y="0"/>
-            <a:ext cx="8519760" cy="572040"/>
+            <a:ext cx="8519400" cy="571680"/>
           </a:xfrm>
           <a:prstGeom prst="rect">
             <a:avLst/>
@@ -4000,7 +4014,7 @@
         <p:spPr>
           <a:xfrm>
             <a:off x="403200" y="572760"/>
-            <a:ext cx="7072560" cy="4570200"/>
+            <a:ext cx="7072200" cy="4569840"/>
           </a:xfrm>
           <a:prstGeom prst="rect">
             <a:avLst/>
@@ -4068,7 +4082,7 @@
         <p:spPr>
           <a:xfrm>
             <a:off x="311760" y="0"/>
-            <a:ext cx="8519760" cy="572040"/>
+            <a:ext cx="8519400" cy="571680"/>
           </a:xfrm>
           <a:prstGeom prst="rect">
             <a:avLst/>
@@ -4133,8 +4147,8 @@
         </p:blipFill>
         <p:spPr>
           <a:xfrm>
-            <a:off x="491400" y="720000"/>
-            <a:ext cx="6276600" cy="4247640"/>
+            <a:off x="487440" y="571680"/>
+            <a:ext cx="6928560" cy="4506120"/>
           </a:xfrm>
           <a:prstGeom prst="rect">
             <a:avLst/>
@@ -4202,7 +4216,7 @@
         <p:spPr>
           <a:xfrm>
             <a:off x="311760" y="1152360"/>
-            <a:ext cx="8519760" cy="3415680"/>
+            <a:ext cx="8519400" cy="3415320"/>
           </a:xfrm>
           <a:prstGeom prst="rect">
             <a:avLst/>

</xml_diff>